<commit_message>
Pushing up the latest edits of these documents.
</commit_message>
<xml_diff>
--- a/Documentation/MarFS-Brighttalk-LANL-Grider-11-2015-short.pptx
+++ b/Documentation/MarFS-Brighttalk-LANL-Grider-11-2015-short.pptx
@@ -5,7 +5,7 @@
     <p:sldMasterId id="2147483648" r:id="rId1"/>
   </p:sldMasterIdLst>
   <p:notesMasterIdLst>
-    <p:notesMasterId r:id="rId24"/>
+    <p:notesMasterId r:id="rId25"/>
   </p:notesMasterIdLst>
   <p:sldIdLst>
     <p:sldId id="285" r:id="rId2"/>
@@ -27,9 +27,10 @@
     <p:sldId id="259" r:id="rId18"/>
     <p:sldId id="271" r:id="rId19"/>
     <p:sldId id="280" r:id="rId20"/>
-    <p:sldId id="279" r:id="rId21"/>
-    <p:sldId id="262" r:id="rId22"/>
-    <p:sldId id="287" r:id="rId23"/>
+    <p:sldId id="292" r:id="rId21"/>
+    <p:sldId id="279" r:id="rId22"/>
+    <p:sldId id="262" r:id="rId23"/>
+    <p:sldId id="287" r:id="rId24"/>
   </p:sldIdLst>
   <p:sldSz cx="9144000" cy="6858000" type="screen4x3"/>
   <p:notesSz cx="6858000" cy="9144000"/>
@@ -213,7 +214,7 @@
           <a:p>
             <a:fld id="{75BED3BB-8143-B242-94E3-1A47AE754DC0}" type="datetimeFigureOut">
               <a:rPr lang="en-US" smtClean="0"/>
-              <a:t>9/28/15</a:t>
+              <a:t>10/2/2015</a:t>
             </a:fld>
             <a:endParaRPr lang="en-US"/>
           </a:p>
@@ -1164,7 +1165,7 @@
           <a:p>
             <a:fld id="{E56B258B-56D6-9F4B-8030-AEA09AD708E7}" type="datetimeFigureOut">
               <a:rPr lang="en-US" smtClean="0"/>
-              <a:t>9/28/15</a:t>
+              <a:t>10/2/2015</a:t>
             </a:fld>
             <a:endParaRPr lang="en-US"/>
           </a:p>
@@ -1334,7 +1335,7 @@
           <a:p>
             <a:fld id="{E56B258B-56D6-9F4B-8030-AEA09AD708E7}" type="datetimeFigureOut">
               <a:rPr lang="en-US" smtClean="0"/>
-              <a:t>9/28/15</a:t>
+              <a:t>10/2/2015</a:t>
             </a:fld>
             <a:endParaRPr lang="en-US"/>
           </a:p>
@@ -1514,7 +1515,7 @@
           <a:p>
             <a:fld id="{E56B258B-56D6-9F4B-8030-AEA09AD708E7}" type="datetimeFigureOut">
               <a:rPr lang="en-US" smtClean="0"/>
-              <a:t>9/28/15</a:t>
+              <a:t>10/2/2015</a:t>
             </a:fld>
             <a:endParaRPr lang="en-US"/>
           </a:p>
@@ -1684,7 +1685,7 @@
           <a:p>
             <a:fld id="{E56B258B-56D6-9F4B-8030-AEA09AD708E7}" type="datetimeFigureOut">
               <a:rPr lang="en-US" smtClean="0"/>
-              <a:t>9/28/15</a:t>
+              <a:t>10/2/2015</a:t>
             </a:fld>
             <a:endParaRPr lang="en-US"/>
           </a:p>
@@ -1930,7 +1931,7 @@
           <a:p>
             <a:fld id="{E56B258B-56D6-9F4B-8030-AEA09AD708E7}" type="datetimeFigureOut">
               <a:rPr lang="en-US" smtClean="0"/>
-              <a:t>9/28/15</a:t>
+              <a:t>10/2/2015</a:t>
             </a:fld>
             <a:endParaRPr lang="en-US"/>
           </a:p>
@@ -2218,7 +2219,7 @@
           <a:p>
             <a:fld id="{E56B258B-56D6-9F4B-8030-AEA09AD708E7}" type="datetimeFigureOut">
               <a:rPr lang="en-US" smtClean="0"/>
-              <a:t>9/28/15</a:t>
+              <a:t>10/2/2015</a:t>
             </a:fld>
             <a:endParaRPr lang="en-US"/>
           </a:p>
@@ -2640,7 +2641,7 @@
           <a:p>
             <a:fld id="{E56B258B-56D6-9F4B-8030-AEA09AD708E7}" type="datetimeFigureOut">
               <a:rPr lang="en-US" smtClean="0"/>
-              <a:t>9/28/15</a:t>
+              <a:t>10/2/2015</a:t>
             </a:fld>
             <a:endParaRPr lang="en-US"/>
           </a:p>
@@ -2758,7 +2759,7 @@
           <a:p>
             <a:fld id="{E56B258B-56D6-9F4B-8030-AEA09AD708E7}" type="datetimeFigureOut">
               <a:rPr lang="en-US" smtClean="0"/>
-              <a:t>9/28/15</a:t>
+              <a:t>10/2/2015</a:t>
             </a:fld>
             <a:endParaRPr lang="en-US"/>
           </a:p>
@@ -2853,7 +2854,7 @@
           <a:p>
             <a:fld id="{E56B258B-56D6-9F4B-8030-AEA09AD708E7}" type="datetimeFigureOut">
               <a:rPr lang="en-US" smtClean="0"/>
-              <a:t>9/28/15</a:t>
+              <a:t>10/2/2015</a:t>
             </a:fld>
             <a:endParaRPr lang="en-US"/>
           </a:p>
@@ -3130,7 +3131,7 @@
           <a:p>
             <a:fld id="{E56B258B-56D6-9F4B-8030-AEA09AD708E7}" type="datetimeFigureOut">
               <a:rPr lang="en-US" smtClean="0"/>
-              <a:t>9/28/15</a:t>
+              <a:t>10/2/2015</a:t>
             </a:fld>
             <a:endParaRPr lang="en-US"/>
           </a:p>
@@ -3383,7 +3384,7 @@
           <a:p>
             <a:fld id="{E56B258B-56D6-9F4B-8030-AEA09AD708E7}" type="datetimeFigureOut">
               <a:rPr lang="en-US" smtClean="0"/>
-              <a:t>9/28/15</a:t>
+              <a:t>10/2/2015</a:t>
             </a:fld>
             <a:endParaRPr lang="en-US"/>
           </a:p>
@@ -3596,7 +3597,7 @@
           <a:p>
             <a:fld id="{E56B258B-56D6-9F4B-8030-AEA09AD708E7}" type="datetimeFigureOut">
               <a:rPr lang="en-US" smtClean="0"/>
-              <a:t>9/28/15</a:t>
+              <a:t>10/2/2015</a:t>
             </a:fld>
             <a:endParaRPr lang="en-US"/>
           </a:p>
@@ -16775,6 +16776,52 @@
       </p:grpSpPr>
       <p:sp>
         <p:nvSpPr>
+          <p:cNvPr id="4" name="TextBox 3"/>
+          <p:cNvSpPr txBox="1"/>
+          <p:nvPr/>
+        </p:nvSpPr>
+        <p:spPr>
+          <a:xfrm>
+            <a:off x="108642" y="962302"/>
+            <a:ext cx="506994" cy="1015663"/>
+          </a:xfrm>
+          <a:prstGeom prst="rect">
+            <a:avLst/>
+          </a:prstGeom>
+          <a:noFill/>
+          <a:ln>
+            <a:solidFill>
+              <a:schemeClr val="accent1"/>
+            </a:solidFill>
+          </a:ln>
+        </p:spPr>
+        <p:txBody>
+          <a:bodyPr wrap="square" rtlCol="0">
+            <a:spAutoFit/>
+          </a:bodyPr>
+          <a:lstStyle/>
+          <a:p>
+            <a:pPr algn="ctr"/>
+            <a:r>
+              <a:rPr lang="en-US" sz="1200" dirty="0" smtClean="0"/>
+              <a:t>4 PB BB</a:t>
+            </a:r>
+          </a:p>
+          <a:p>
+            <a:pPr algn="ctr"/>
+            <a:r>
+              <a:rPr lang="en-US" sz="1200" dirty="0" smtClean="0"/>
+              <a:t>2 TB/S</a:t>
+            </a:r>
+          </a:p>
+          <a:p>
+            <a:pPr algn="ctr"/>
+            <a:endParaRPr lang="en-US" sz="1200" dirty="0"/>
+          </a:p>
+        </p:txBody>
+      </p:sp>
+      <p:sp>
+        <p:nvSpPr>
           <p:cNvPr id="2" name="Title 1"/>
           <p:cNvSpPr>
             <a:spLocks noGrp="1"/>
@@ -16785,38 +16832,8 @@
         </p:nvSpPr>
         <p:spPr>
           <a:xfrm>
-            <a:off x="457200" y="7938"/>
-            <a:ext cx="8229600" cy="512762"/>
-          </a:xfrm>
-        </p:spPr>
-        <p:txBody>
-          <a:bodyPr>
-            <a:normAutofit fontScale="90000"/>
-          </a:bodyPr>
-          <a:lstStyle/>
-          <a:p>
-            <a:r>
-              <a:rPr lang="en-US" dirty="0" smtClean="0"/>
-              <a:t>Security Model</a:t>
-            </a:r>
-            <a:endParaRPr lang="en-US" dirty="0"/>
-          </a:p>
-        </p:txBody>
-      </p:sp>
-      <p:sp>
-        <p:nvSpPr>
-          <p:cNvPr id="3" name="Content Placeholder 2"/>
-          <p:cNvSpPr>
-            <a:spLocks noGrp="1"/>
-          </p:cNvSpPr>
-          <p:nvPr>
-            <p:ph idx="1"/>
-          </p:nvPr>
-        </p:nvSpPr>
-        <p:spPr>
-          <a:xfrm>
-            <a:off x="114300" y="723900"/>
-            <a:ext cx="8915400" cy="6159500"/>
+            <a:off x="253497" y="75462"/>
+            <a:ext cx="8564578" cy="657869"/>
           </a:xfrm>
         </p:spPr>
         <p:txBody>
@@ -16826,237 +16843,2099 @@
           <a:lstStyle/>
           <a:p>
             <a:r>
-              <a:rPr lang="en-US" sz="2000" dirty="0"/>
-              <a:t>All  POSIX security is obeyed by </a:t>
-            </a:r>
-            <a:r>
-              <a:rPr lang="en-US" sz="2000" dirty="0" err="1" smtClean="0"/>
-              <a:t>MarFS</a:t>
-            </a:r>
-            <a:endParaRPr lang="en-US" sz="2000" dirty="0" smtClean="0"/>
-          </a:p>
-          <a:p>
-            <a:r>
-              <a:rPr lang="en-US" sz="2000" dirty="0"/>
-              <a:t>A</a:t>
-            </a:r>
-            <a:r>
-              <a:rPr lang="en-US" sz="2000" dirty="0" smtClean="0"/>
-              <a:t>ddition </a:t>
-            </a:r>
-            <a:r>
-              <a:rPr lang="en-US" sz="2000" dirty="0"/>
-              <a:t>special security can be added by configuration to manage what parts of the name space allow metadata and data update/</a:t>
-            </a:r>
-            <a:r>
-              <a:rPr lang="en-US" sz="2000" dirty="0" smtClean="0"/>
-              <a:t>read </a:t>
-            </a:r>
-          </a:p>
-          <a:p>
-            <a:pPr lvl="1"/>
-            <a:r>
-              <a:rPr lang="en-US" sz="2000" dirty="0" smtClean="0"/>
-              <a:t>and </a:t>
-            </a:r>
-            <a:r>
-              <a:rPr lang="en-US" sz="2000" dirty="0"/>
-              <a:t>you can control those special permissions for interactive and batch </a:t>
-            </a:r>
-            <a:r>
-              <a:rPr lang="en-US" sz="2000" dirty="0" smtClean="0"/>
-              <a:t>separately per name space.</a:t>
-            </a:r>
-            <a:endParaRPr lang="en-US" sz="2000" dirty="0"/>
-          </a:p>
-          <a:p>
-            <a:pPr lvl="2"/>
-            <a:r>
-              <a:rPr lang="en-US" sz="2000" dirty="0" err="1"/>
-              <a:t>rm</a:t>
-            </a:r>
-            <a:r>
-              <a:rPr lang="en-US" sz="2000" dirty="0"/>
-              <a:t> – read </a:t>
-            </a:r>
-            <a:r>
-              <a:rPr lang="en-US" sz="2000" dirty="0" smtClean="0"/>
-              <a:t>metadata    </a:t>
-            </a:r>
-            <a:r>
-              <a:rPr lang="en-US" sz="2000" dirty="0" err="1" smtClean="0"/>
-              <a:t>wm</a:t>
-            </a:r>
-            <a:r>
-              <a:rPr lang="en-US" sz="2000" dirty="0" smtClean="0"/>
-              <a:t> </a:t>
-            </a:r>
-            <a:r>
-              <a:rPr lang="en-US" sz="2000" dirty="0"/>
-              <a:t>– write </a:t>
-            </a:r>
-            <a:r>
-              <a:rPr lang="en-US" sz="2000" dirty="0" smtClean="0"/>
-              <a:t>metadata    </a:t>
-            </a:r>
-            <a:r>
-              <a:rPr lang="en-US" sz="2000" dirty="0" err="1" smtClean="0"/>
-              <a:t>rd</a:t>
-            </a:r>
-            <a:r>
-              <a:rPr lang="en-US" sz="2000" dirty="0" smtClean="0"/>
-              <a:t> </a:t>
-            </a:r>
-            <a:r>
-              <a:rPr lang="en-US" sz="2000" dirty="0"/>
-              <a:t>– read </a:t>
-            </a:r>
-            <a:r>
-              <a:rPr lang="en-US" sz="2000" dirty="0" smtClean="0"/>
-              <a:t>data     </a:t>
-            </a:r>
-            <a:r>
-              <a:rPr lang="en-US" sz="2000" dirty="0" err="1" smtClean="0"/>
-              <a:t>wd</a:t>
-            </a:r>
-            <a:r>
-              <a:rPr lang="en-US" sz="2000" dirty="0" smtClean="0"/>
-              <a:t> </a:t>
-            </a:r>
-            <a:r>
-              <a:rPr lang="en-US" sz="2000" dirty="0"/>
-              <a:t>– write </a:t>
-            </a:r>
-            <a:r>
-              <a:rPr lang="en-US" sz="2000" dirty="0" smtClean="0"/>
-              <a:t>data    </a:t>
-            </a:r>
-            <a:r>
-              <a:rPr lang="en-US" sz="2000" dirty="0" err="1" smtClean="0"/>
-              <a:t>ud</a:t>
-            </a:r>
-            <a:r>
-              <a:rPr lang="en-US" sz="2000" dirty="0" smtClean="0"/>
-              <a:t> </a:t>
-            </a:r>
-            <a:r>
-              <a:rPr lang="en-US" sz="2000" dirty="0"/>
-              <a:t>– unlink data</a:t>
-            </a:r>
-          </a:p>
-          <a:p>
-            <a:pPr lvl="2"/>
-            <a:r>
-              <a:rPr lang="en-US" sz="2000" dirty="0" smtClean="0"/>
-              <a:t>Can lock down data read/write separately from metadata read/update</a:t>
-            </a:r>
-          </a:p>
-          <a:p>
-            <a:pPr lvl="2"/>
-            <a:r>
-              <a:rPr lang="en-US" sz="2000" dirty="0"/>
-              <a:t>V</a:t>
-            </a:r>
-            <a:r>
-              <a:rPr lang="en-US" sz="2000" dirty="0" smtClean="0"/>
-              <a:t>alue </a:t>
-            </a:r>
-            <a:r>
-              <a:rPr lang="en-US" sz="2000" dirty="0"/>
-              <a:t>is not stored with the file, </a:t>
-            </a:r>
-            <a:r>
-              <a:rPr lang="en-US" sz="2000" dirty="0" smtClean="0"/>
-              <a:t>real </a:t>
-            </a:r>
-            <a:r>
-              <a:rPr lang="en-US" sz="2000" dirty="0"/>
-              <a:t>time, </a:t>
-            </a:r>
-            <a:r>
-              <a:rPr lang="en-US" sz="2000" dirty="0" smtClean="0"/>
-              <a:t>fast </a:t>
-            </a:r>
-            <a:r>
-              <a:rPr lang="en-US" sz="2000" dirty="0"/>
-              <a:t>way to </a:t>
-            </a:r>
-            <a:r>
-              <a:rPr lang="en-US" sz="2000" dirty="0" smtClean="0"/>
-              <a:t>control access.</a:t>
-            </a:r>
-            <a:endParaRPr lang="en-US" sz="2000" dirty="0"/>
-          </a:p>
-          <a:p>
-            <a:r>
-              <a:rPr lang="en-US" sz="2000" dirty="0"/>
-              <a:t>Object Security is provided by the following methods</a:t>
-            </a:r>
-          </a:p>
-          <a:p>
-            <a:pPr lvl="1"/>
-            <a:r>
-              <a:rPr lang="en-US" sz="2000" dirty="0" smtClean="0"/>
-              <a:t>Password for Object Server access is stashed safely, can be time based, crypto securely sent to Object Server on every request.</a:t>
-            </a:r>
-          </a:p>
-          <a:p>
-            <a:pPr lvl="1"/>
-            <a:r>
-              <a:rPr lang="en-US" sz="2000" dirty="0" smtClean="0"/>
-              <a:t>Encryption in the </a:t>
-            </a:r>
-            <a:r>
-              <a:rPr lang="en-US" sz="2000" dirty="0"/>
-              <a:t>data path </a:t>
-            </a:r>
-            <a:r>
-              <a:rPr lang="en-US" sz="2000" dirty="0" smtClean="0"/>
-              <a:t>to objects can be turned on</a:t>
-            </a:r>
-          </a:p>
-          <a:p>
-            <a:pPr lvl="1"/>
-            <a:r>
-              <a:rPr lang="en-US" sz="2000" dirty="0" smtClean="0"/>
-              <a:t>Encryption </a:t>
-            </a:r>
-            <a:r>
-              <a:rPr lang="en-US" sz="2000" dirty="0"/>
-              <a:t>at rest </a:t>
-            </a:r>
-            <a:r>
-              <a:rPr lang="en-US" sz="2000" dirty="0" smtClean="0"/>
-              <a:t>could be implemented and is on the futures list. </a:t>
-            </a:r>
-            <a:r>
-              <a:rPr lang="en-US" sz="2000" dirty="0"/>
-              <a:t> </a:t>
-            </a:r>
-            <a:endParaRPr lang="en-US" sz="2000" dirty="0" smtClean="0"/>
-          </a:p>
-          <a:p>
-            <a:pPr lvl="1"/>
-            <a:r>
-              <a:rPr lang="en-US" sz="2000" dirty="0" smtClean="0"/>
-              <a:t>Protecting </a:t>
-            </a:r>
-            <a:r>
-              <a:rPr lang="en-US" sz="2000" dirty="0"/>
-              <a:t>the trash is essential </a:t>
-            </a:r>
-            <a:r>
-              <a:rPr lang="en-US" sz="2000" dirty="0" smtClean="0"/>
-              <a:t>as well</a:t>
-            </a:r>
-            <a:endParaRPr lang="en-US" sz="2000" dirty="0"/>
+              <a:rPr lang="en-US" sz="3200" dirty="0" smtClean="0"/>
+              <a:t>How does it fit into our environment (circa FY16) ?</a:t>
+            </a:r>
+            <a:endParaRPr lang="en-US" sz="3200" dirty="0"/>
+          </a:p>
+        </p:txBody>
+      </p:sp>
+      <p:sp>
+        <p:nvSpPr>
+          <p:cNvPr id="3" name="TextBox 2"/>
+          <p:cNvSpPr txBox="1"/>
+          <p:nvPr/>
+        </p:nvSpPr>
+        <p:spPr>
+          <a:xfrm>
+            <a:off x="615635" y="962302"/>
+            <a:ext cx="1837854" cy="923330"/>
+          </a:xfrm>
+          <a:prstGeom prst="rect">
+            <a:avLst/>
+          </a:prstGeom>
+          <a:noFill/>
+          <a:ln>
+            <a:solidFill>
+              <a:schemeClr val="accent1"/>
+            </a:solidFill>
+          </a:ln>
+        </p:spPr>
+        <p:txBody>
+          <a:bodyPr wrap="square" rtlCol="0">
+            <a:spAutoFit/>
+          </a:bodyPr>
+          <a:lstStyle/>
+          <a:p>
+            <a:pPr algn="ctr"/>
+            <a:r>
+              <a:rPr lang="en-US" dirty="0" smtClean="0"/>
+              <a:t>Premier Machine 2PB Dram </a:t>
+            </a:r>
+          </a:p>
+          <a:p>
+            <a:pPr algn="ctr"/>
+            <a:endParaRPr lang="en-US" dirty="0"/>
+          </a:p>
+        </p:txBody>
+      </p:sp>
+      <p:sp>
+        <p:nvSpPr>
+          <p:cNvPr id="5" name="TextBox 4"/>
+          <p:cNvSpPr txBox="1"/>
+          <p:nvPr/>
+        </p:nvSpPr>
+        <p:spPr>
+          <a:xfrm>
+            <a:off x="1167897" y="1885632"/>
+            <a:ext cx="1285593" cy="646331"/>
+          </a:xfrm>
+          <a:prstGeom prst="rect">
+            <a:avLst/>
+          </a:prstGeom>
+          <a:noFill/>
+          <a:ln>
+            <a:solidFill>
+              <a:schemeClr val="accent1"/>
+            </a:solidFill>
+          </a:ln>
+        </p:spPr>
+        <p:txBody>
+          <a:bodyPr wrap="square" rtlCol="0">
+            <a:spAutoFit/>
+          </a:bodyPr>
+          <a:lstStyle/>
+          <a:p>
+            <a:pPr algn="ctr"/>
+            <a:r>
+              <a:rPr lang="en-US" dirty="0" smtClean="0"/>
+              <a:t>General IO Nodes</a:t>
+            </a:r>
+            <a:endParaRPr lang="en-US" dirty="0"/>
+          </a:p>
+        </p:txBody>
+      </p:sp>
+      <p:sp>
+        <p:nvSpPr>
+          <p:cNvPr id="6" name="TextBox 5"/>
+          <p:cNvSpPr txBox="1"/>
+          <p:nvPr/>
+        </p:nvSpPr>
+        <p:spPr>
+          <a:xfrm>
+            <a:off x="108642" y="1885632"/>
+            <a:ext cx="1059255" cy="646331"/>
+          </a:xfrm>
+          <a:prstGeom prst="rect">
+            <a:avLst/>
+          </a:prstGeom>
+          <a:solidFill>
+            <a:schemeClr val="bg1"/>
+          </a:solidFill>
+          <a:ln>
+            <a:solidFill>
+              <a:schemeClr val="accent1"/>
+            </a:solidFill>
+          </a:ln>
+        </p:spPr>
+        <p:txBody>
+          <a:bodyPr wrap="square" rtlCol="0">
+            <a:spAutoFit/>
+          </a:bodyPr>
+          <a:lstStyle/>
+          <a:p>
+            <a:pPr algn="ctr"/>
+            <a:r>
+              <a:rPr lang="en-US" dirty="0" smtClean="0"/>
+              <a:t>Private IO Nodes</a:t>
+            </a:r>
+            <a:endParaRPr lang="en-US" dirty="0"/>
+          </a:p>
+        </p:txBody>
+      </p:sp>
+      <p:grpSp>
+        <p:nvGrpSpPr>
+          <p:cNvPr id="9" name="Group 8"/>
+          <p:cNvGrpSpPr/>
+          <p:nvPr/>
+        </p:nvGrpSpPr>
+        <p:grpSpPr>
+          <a:xfrm>
+            <a:off x="4098201" y="701668"/>
+            <a:ext cx="1231271" cy="1846660"/>
+            <a:chOff x="4098201" y="1009470"/>
+            <a:chExt cx="1231271" cy="1846660"/>
+          </a:xfrm>
+        </p:grpSpPr>
+        <p:sp>
+          <p:nvSpPr>
+            <p:cNvPr id="7" name="TextBox 6"/>
+            <p:cNvSpPr txBox="1"/>
+            <p:nvPr/>
+          </p:nvSpPr>
+          <p:spPr>
+            <a:xfrm>
+              <a:off x="4098201" y="1009470"/>
+              <a:ext cx="1231271" cy="1200329"/>
+            </a:xfrm>
+            <a:prstGeom prst="rect">
+              <a:avLst/>
+            </a:prstGeom>
+            <a:noFill/>
+            <a:ln>
+              <a:solidFill>
+                <a:schemeClr val="accent1"/>
+              </a:solidFill>
+            </a:ln>
+          </p:spPr>
+          <p:txBody>
+            <a:bodyPr wrap="square" rtlCol="0">
+              <a:spAutoFit/>
+            </a:bodyPr>
+            <a:lstStyle/>
+            <a:p>
+              <a:pPr algn="ctr"/>
+              <a:r>
+                <a:rPr lang="en-US" dirty="0" smtClean="0"/>
+                <a:t>Capacity machines ~50-300 TB Dram</a:t>
+              </a:r>
+              <a:endParaRPr lang="en-US" dirty="0"/>
+            </a:p>
+          </p:txBody>
+        </p:sp>
+        <p:sp>
+          <p:nvSpPr>
+            <p:cNvPr id="8" name="TextBox 7"/>
+            <p:cNvSpPr txBox="1"/>
+            <p:nvPr/>
+          </p:nvSpPr>
+          <p:spPr>
+            <a:xfrm>
+              <a:off x="4098201" y="2209799"/>
+              <a:ext cx="1231271" cy="646331"/>
+            </a:xfrm>
+            <a:prstGeom prst="rect">
+              <a:avLst/>
+            </a:prstGeom>
+            <a:noFill/>
+            <a:ln>
+              <a:solidFill>
+                <a:schemeClr val="accent1"/>
+              </a:solidFill>
+            </a:ln>
+          </p:spPr>
+          <p:txBody>
+            <a:bodyPr wrap="square" rtlCol="0">
+              <a:spAutoFit/>
+            </a:bodyPr>
+            <a:lstStyle/>
+            <a:p>
+              <a:pPr algn="ctr"/>
+              <a:r>
+                <a:rPr lang="en-US" dirty="0" smtClean="0"/>
+                <a:t>General IO Nodes</a:t>
+              </a:r>
+              <a:endParaRPr lang="en-US" dirty="0"/>
+            </a:p>
+          </p:txBody>
+        </p:sp>
+      </p:grpSp>
+      <p:grpSp>
+        <p:nvGrpSpPr>
+          <p:cNvPr id="10" name="Group 9"/>
+          <p:cNvGrpSpPr/>
+          <p:nvPr/>
+        </p:nvGrpSpPr>
+        <p:grpSpPr>
+          <a:xfrm>
+            <a:off x="6405325" y="701668"/>
+            <a:ext cx="1231271" cy="1846660"/>
+            <a:chOff x="4098201" y="1009470"/>
+            <a:chExt cx="1231271" cy="1846660"/>
+          </a:xfrm>
+        </p:grpSpPr>
+        <p:sp>
+          <p:nvSpPr>
+            <p:cNvPr id="11" name="TextBox 10"/>
+            <p:cNvSpPr txBox="1"/>
+            <p:nvPr/>
+          </p:nvSpPr>
+          <p:spPr>
+            <a:xfrm>
+              <a:off x="4098201" y="1009470"/>
+              <a:ext cx="1231271" cy="1200329"/>
+            </a:xfrm>
+            <a:prstGeom prst="rect">
+              <a:avLst/>
+            </a:prstGeom>
+            <a:noFill/>
+            <a:ln>
+              <a:solidFill>
+                <a:schemeClr val="accent1"/>
+              </a:solidFill>
+            </a:ln>
+          </p:spPr>
+          <p:txBody>
+            <a:bodyPr wrap="square" rtlCol="0">
+              <a:spAutoFit/>
+            </a:bodyPr>
+            <a:lstStyle/>
+            <a:p>
+              <a:pPr algn="ctr"/>
+              <a:r>
+                <a:rPr lang="en-US" dirty="0" smtClean="0"/>
+                <a:t>Capacity machines ~50-300 TB Dram</a:t>
+              </a:r>
+              <a:endParaRPr lang="en-US" dirty="0"/>
+            </a:p>
+          </p:txBody>
+        </p:sp>
+        <p:sp>
+          <p:nvSpPr>
+            <p:cNvPr id="12" name="TextBox 11"/>
+            <p:cNvSpPr txBox="1"/>
+            <p:nvPr/>
+          </p:nvSpPr>
+          <p:spPr>
+            <a:xfrm>
+              <a:off x="4098201" y="2209799"/>
+              <a:ext cx="1231271" cy="646331"/>
+            </a:xfrm>
+            <a:prstGeom prst="rect">
+              <a:avLst/>
+            </a:prstGeom>
+            <a:noFill/>
+            <a:ln>
+              <a:solidFill>
+                <a:schemeClr val="accent1"/>
+              </a:solidFill>
+            </a:ln>
+          </p:spPr>
+          <p:txBody>
+            <a:bodyPr wrap="square" rtlCol="0">
+              <a:spAutoFit/>
+            </a:bodyPr>
+            <a:lstStyle/>
+            <a:p>
+              <a:pPr algn="ctr"/>
+              <a:r>
+                <a:rPr lang="en-US" dirty="0" smtClean="0"/>
+                <a:t>General IO Nodes</a:t>
+              </a:r>
+              <a:endParaRPr lang="en-US" dirty="0"/>
+            </a:p>
+          </p:txBody>
+        </p:sp>
+      </p:grpSp>
+      <p:grpSp>
+        <p:nvGrpSpPr>
+          <p:cNvPr id="16" name="Group 15"/>
+          <p:cNvGrpSpPr/>
+          <p:nvPr/>
+        </p:nvGrpSpPr>
+        <p:grpSpPr>
+          <a:xfrm>
+            <a:off x="5649362" y="1493347"/>
+            <a:ext cx="401369" cy="84483"/>
+            <a:chOff x="4617267" y="3500689"/>
+            <a:chExt cx="401369" cy="84483"/>
+          </a:xfrm>
+        </p:grpSpPr>
+        <p:sp>
+          <p:nvSpPr>
+            <p:cNvPr id="13" name="Oval 12"/>
+            <p:cNvSpPr/>
+            <p:nvPr/>
+          </p:nvSpPr>
+          <p:spPr>
+            <a:xfrm>
+              <a:off x="4617267" y="3503691"/>
+              <a:ext cx="96569" cy="81481"/>
+            </a:xfrm>
+            <a:prstGeom prst="ellipse">
+              <a:avLst/>
+            </a:prstGeom>
+          </p:spPr>
+          <p:style>
+            <a:lnRef idx="1">
+              <a:schemeClr val="accent1"/>
+            </a:lnRef>
+            <a:fillRef idx="3">
+              <a:schemeClr val="accent1"/>
+            </a:fillRef>
+            <a:effectRef idx="2">
+              <a:schemeClr val="accent1"/>
+            </a:effectRef>
+            <a:fontRef idx="minor">
+              <a:schemeClr val="lt1"/>
+            </a:fontRef>
+          </p:style>
+          <p:txBody>
+            <a:bodyPr rtlCol="0" anchor="ctr"/>
+            <a:lstStyle/>
+            <a:p>
+              <a:pPr algn="ctr"/>
+              <a:endParaRPr lang="en-US"/>
+            </a:p>
+          </p:txBody>
+        </p:sp>
+        <p:sp>
+          <p:nvSpPr>
+            <p:cNvPr id="14" name="Oval 13"/>
+            <p:cNvSpPr/>
+            <p:nvPr/>
+          </p:nvSpPr>
+          <p:spPr>
+            <a:xfrm>
+              <a:off x="4769667" y="3502190"/>
+              <a:ext cx="96569" cy="81481"/>
+            </a:xfrm>
+            <a:prstGeom prst="ellipse">
+              <a:avLst/>
+            </a:prstGeom>
+          </p:spPr>
+          <p:style>
+            <a:lnRef idx="1">
+              <a:schemeClr val="accent1"/>
+            </a:lnRef>
+            <a:fillRef idx="3">
+              <a:schemeClr val="accent1"/>
+            </a:fillRef>
+            <a:effectRef idx="2">
+              <a:schemeClr val="accent1"/>
+            </a:effectRef>
+            <a:fontRef idx="minor">
+              <a:schemeClr val="lt1"/>
+            </a:fontRef>
+          </p:style>
+          <p:txBody>
+            <a:bodyPr rtlCol="0" anchor="ctr"/>
+            <a:lstStyle/>
+            <a:p>
+              <a:pPr algn="ctr"/>
+              <a:endParaRPr lang="en-US"/>
+            </a:p>
+          </p:txBody>
+        </p:sp>
+        <p:sp>
+          <p:nvSpPr>
+            <p:cNvPr id="15" name="Oval 14"/>
+            <p:cNvSpPr/>
+            <p:nvPr/>
+          </p:nvSpPr>
+          <p:spPr>
+            <a:xfrm>
+              <a:off x="4922067" y="3500689"/>
+              <a:ext cx="96569" cy="81481"/>
+            </a:xfrm>
+            <a:prstGeom prst="ellipse">
+              <a:avLst/>
+            </a:prstGeom>
+          </p:spPr>
+          <p:style>
+            <a:lnRef idx="1">
+              <a:schemeClr val="accent1"/>
+            </a:lnRef>
+            <a:fillRef idx="3">
+              <a:schemeClr val="accent1"/>
+            </a:fillRef>
+            <a:effectRef idx="2">
+              <a:schemeClr val="accent1"/>
+            </a:effectRef>
+            <a:fontRef idx="minor">
+              <a:schemeClr val="lt1"/>
+            </a:fontRef>
+          </p:style>
+          <p:txBody>
+            <a:bodyPr rtlCol="0" anchor="ctr"/>
+            <a:lstStyle/>
+            <a:p>
+              <a:pPr algn="ctr"/>
+              <a:endParaRPr lang="en-US"/>
+            </a:p>
+          </p:txBody>
+        </p:sp>
+      </p:grpSp>
+      <p:sp>
+        <p:nvSpPr>
+          <p:cNvPr id="17" name="TextBox 16"/>
+          <p:cNvSpPr txBox="1"/>
+          <p:nvPr/>
+        </p:nvSpPr>
+        <p:spPr>
+          <a:xfrm>
+            <a:off x="2453489" y="1162331"/>
+            <a:ext cx="1575303" cy="830997"/>
+          </a:xfrm>
+          <a:prstGeom prst="rect">
+            <a:avLst/>
+          </a:prstGeom>
+          <a:noFill/>
+        </p:spPr>
+        <p:txBody>
+          <a:bodyPr wrap="square" rtlCol="0">
+            <a:spAutoFit/>
+          </a:bodyPr>
+          <a:lstStyle/>
+          <a:p>
+            <a:r>
+              <a:rPr lang="en-US" sz="1200" dirty="0" smtClean="0"/>
+              <a:t>/</a:t>
+            </a:r>
+            <a:r>
+              <a:rPr lang="en-US" sz="1200" dirty="0" err="1" smtClean="0"/>
+              <a:t>localscratch</a:t>
+            </a:r>
+            <a:r>
+              <a:rPr lang="en-US" sz="1200" dirty="0" smtClean="0"/>
+              <a:t>(s)</a:t>
+            </a:r>
+          </a:p>
+          <a:p>
+            <a:r>
+              <a:rPr lang="en-US" sz="1200" dirty="0" smtClean="0"/>
+              <a:t>/</a:t>
+            </a:r>
+            <a:r>
+              <a:rPr lang="en-US" sz="1200" dirty="0" err="1" smtClean="0"/>
+              <a:t>sitescratch</a:t>
+            </a:r>
+            <a:r>
+              <a:rPr lang="en-US" sz="1200" dirty="0" smtClean="0"/>
+              <a:t>(s)</a:t>
+            </a:r>
+          </a:p>
+          <a:p>
+            <a:r>
+              <a:rPr lang="en-US" sz="1200" dirty="0" smtClean="0"/>
+              <a:t>/home</a:t>
+            </a:r>
+          </a:p>
+          <a:p>
+            <a:r>
+              <a:rPr lang="en-US" sz="1200" dirty="0" smtClean="0"/>
+              <a:t>/project</a:t>
+            </a:r>
+            <a:endParaRPr lang="en-US" sz="1200" dirty="0"/>
+          </a:p>
+        </p:txBody>
+      </p:sp>
+      <p:sp>
+        <p:nvSpPr>
+          <p:cNvPr id="18" name="TextBox 17"/>
+          <p:cNvSpPr txBox="1"/>
+          <p:nvPr/>
+        </p:nvSpPr>
+        <p:spPr>
+          <a:xfrm>
+            <a:off x="5321171" y="701668"/>
+            <a:ext cx="1575303" cy="646331"/>
+          </a:xfrm>
+          <a:prstGeom prst="rect">
+            <a:avLst/>
+          </a:prstGeom>
+          <a:noFill/>
+        </p:spPr>
+        <p:txBody>
+          <a:bodyPr wrap="square" rtlCol="0">
+            <a:spAutoFit/>
+          </a:bodyPr>
+          <a:lstStyle/>
+          <a:p>
+            <a:r>
+              <a:rPr lang="en-US" sz="1200" dirty="0" smtClean="0"/>
+              <a:t>/</a:t>
+            </a:r>
+            <a:r>
+              <a:rPr lang="en-US" sz="1200" dirty="0" err="1" smtClean="0"/>
+              <a:t>sitescratch</a:t>
+            </a:r>
+            <a:r>
+              <a:rPr lang="en-US" sz="1200" dirty="0" smtClean="0"/>
+              <a:t>(s)</a:t>
+            </a:r>
+          </a:p>
+          <a:p>
+            <a:r>
+              <a:rPr lang="en-US" sz="1200" dirty="0" smtClean="0"/>
+              <a:t>/home</a:t>
+            </a:r>
+          </a:p>
+          <a:p>
+            <a:r>
+              <a:rPr lang="en-US" sz="1200" dirty="0" smtClean="0"/>
+              <a:t>/project</a:t>
+            </a:r>
+            <a:endParaRPr lang="en-US" sz="1200" dirty="0"/>
+          </a:p>
+        </p:txBody>
+      </p:sp>
+      <p:sp>
+        <p:nvSpPr>
+          <p:cNvPr id="20" name="TextBox 19"/>
+          <p:cNvSpPr txBox="1"/>
+          <p:nvPr/>
+        </p:nvSpPr>
+        <p:spPr>
+          <a:xfrm>
+            <a:off x="108642" y="2969557"/>
+            <a:ext cx="1059255" cy="1169551"/>
+          </a:xfrm>
+          <a:prstGeom prst="rect">
+            <a:avLst/>
+          </a:prstGeom>
+          <a:noFill/>
+          <a:ln>
+            <a:solidFill>
+              <a:schemeClr val="accent1"/>
+            </a:solidFill>
+          </a:ln>
+        </p:spPr>
+        <p:txBody>
+          <a:bodyPr wrap="square" rtlCol="0">
+            <a:spAutoFit/>
+          </a:bodyPr>
+          <a:lstStyle/>
+          <a:p>
+            <a:pPr algn="ctr"/>
+            <a:r>
+              <a:rPr lang="en-US" sz="1400" dirty="0" smtClean="0"/>
+              <a:t>Local Scratch</a:t>
+            </a:r>
+          </a:p>
+          <a:p>
+            <a:pPr algn="ctr"/>
+            <a:r>
+              <a:rPr lang="en-US" sz="1400" dirty="0" smtClean="0"/>
+              <a:t>100 PB </a:t>
+            </a:r>
+          </a:p>
+          <a:p>
+            <a:pPr algn="ctr"/>
+            <a:r>
+              <a:rPr lang="en-US" sz="1400" dirty="0" smtClean="0"/>
+              <a:t>1 TB/sec</a:t>
+            </a:r>
+          </a:p>
+          <a:p>
+            <a:pPr algn="ctr"/>
+            <a:r>
+              <a:rPr lang="en-US" sz="1400" dirty="0" smtClean="0"/>
+              <a:t>1-4 Weeks</a:t>
+            </a:r>
+            <a:endParaRPr lang="en-US" sz="1400" dirty="0"/>
+          </a:p>
+        </p:txBody>
+      </p:sp>
+      <p:grpSp>
+        <p:nvGrpSpPr>
+          <p:cNvPr id="22" name="Group 21"/>
+          <p:cNvGrpSpPr/>
+          <p:nvPr/>
+        </p:nvGrpSpPr>
+        <p:grpSpPr>
+          <a:xfrm>
+            <a:off x="437584" y="5419872"/>
+            <a:ext cx="401369" cy="84483"/>
+            <a:chOff x="4617267" y="3500689"/>
+            <a:chExt cx="401369" cy="84483"/>
+          </a:xfrm>
+        </p:grpSpPr>
+        <p:sp>
+          <p:nvSpPr>
+            <p:cNvPr id="23" name="Oval 22"/>
+            <p:cNvSpPr/>
+            <p:nvPr/>
+          </p:nvSpPr>
+          <p:spPr>
+            <a:xfrm>
+              <a:off x="4617267" y="3503691"/>
+              <a:ext cx="96569" cy="81481"/>
+            </a:xfrm>
+            <a:prstGeom prst="ellipse">
+              <a:avLst/>
+            </a:prstGeom>
+          </p:spPr>
+          <p:style>
+            <a:lnRef idx="1">
+              <a:schemeClr val="accent1"/>
+            </a:lnRef>
+            <a:fillRef idx="3">
+              <a:schemeClr val="accent1"/>
+            </a:fillRef>
+            <a:effectRef idx="2">
+              <a:schemeClr val="accent1"/>
+            </a:effectRef>
+            <a:fontRef idx="minor">
+              <a:schemeClr val="lt1"/>
+            </a:fontRef>
+          </p:style>
+          <p:txBody>
+            <a:bodyPr rtlCol="0" anchor="ctr"/>
+            <a:lstStyle/>
+            <a:p>
+              <a:pPr algn="ctr"/>
+              <a:endParaRPr lang="en-US"/>
+            </a:p>
+          </p:txBody>
+        </p:sp>
+        <p:sp>
+          <p:nvSpPr>
+            <p:cNvPr id="24" name="Oval 23"/>
+            <p:cNvSpPr/>
+            <p:nvPr/>
+          </p:nvSpPr>
+          <p:spPr>
+            <a:xfrm>
+              <a:off x="4769667" y="3502190"/>
+              <a:ext cx="96569" cy="81481"/>
+            </a:xfrm>
+            <a:prstGeom prst="ellipse">
+              <a:avLst/>
+            </a:prstGeom>
+          </p:spPr>
+          <p:style>
+            <a:lnRef idx="1">
+              <a:schemeClr val="accent1"/>
+            </a:lnRef>
+            <a:fillRef idx="3">
+              <a:schemeClr val="accent1"/>
+            </a:fillRef>
+            <a:effectRef idx="2">
+              <a:schemeClr val="accent1"/>
+            </a:effectRef>
+            <a:fontRef idx="minor">
+              <a:schemeClr val="lt1"/>
+            </a:fontRef>
+          </p:style>
+          <p:txBody>
+            <a:bodyPr rtlCol="0" anchor="ctr"/>
+            <a:lstStyle/>
+            <a:p>
+              <a:pPr algn="ctr"/>
+              <a:endParaRPr lang="en-US"/>
+            </a:p>
+          </p:txBody>
+        </p:sp>
+        <p:sp>
+          <p:nvSpPr>
+            <p:cNvPr id="25" name="Oval 24"/>
+            <p:cNvSpPr/>
+            <p:nvPr/>
+          </p:nvSpPr>
+          <p:spPr>
+            <a:xfrm>
+              <a:off x="4922067" y="3500689"/>
+              <a:ext cx="96569" cy="81481"/>
+            </a:xfrm>
+            <a:prstGeom prst="ellipse">
+              <a:avLst/>
+            </a:prstGeom>
+          </p:spPr>
+          <p:style>
+            <a:lnRef idx="1">
+              <a:schemeClr val="accent1"/>
+            </a:lnRef>
+            <a:fillRef idx="3">
+              <a:schemeClr val="accent1"/>
+            </a:fillRef>
+            <a:effectRef idx="2">
+              <a:schemeClr val="accent1"/>
+            </a:effectRef>
+            <a:fontRef idx="minor">
+              <a:schemeClr val="lt1"/>
+            </a:fontRef>
+          </p:style>
+          <p:txBody>
+            <a:bodyPr rtlCol="0" anchor="ctr"/>
+            <a:lstStyle/>
+            <a:p>
+              <a:pPr algn="ctr"/>
+              <a:endParaRPr lang="en-US"/>
+            </a:p>
+          </p:txBody>
+        </p:sp>
+      </p:grpSp>
+      <p:sp>
+        <p:nvSpPr>
+          <p:cNvPr id="26" name="TextBox 25"/>
+          <p:cNvSpPr txBox="1"/>
+          <p:nvPr/>
+        </p:nvSpPr>
+        <p:spPr>
+          <a:xfrm>
+            <a:off x="156925" y="4336405"/>
+            <a:ext cx="1059255" cy="954107"/>
+          </a:xfrm>
+          <a:prstGeom prst="rect">
+            <a:avLst/>
+          </a:prstGeom>
+          <a:noFill/>
+          <a:ln>
+            <a:solidFill>
+              <a:schemeClr val="accent1"/>
+            </a:solidFill>
+          </a:ln>
+        </p:spPr>
+        <p:txBody>
+          <a:bodyPr wrap="square" rtlCol="0">
+            <a:spAutoFit/>
+          </a:bodyPr>
+          <a:lstStyle/>
+          <a:p>
+            <a:pPr algn="ctr"/>
+            <a:r>
+              <a:rPr lang="en-US" sz="1400" dirty="0" smtClean="0"/>
+              <a:t>Site  Scratch</a:t>
+            </a:r>
+          </a:p>
+          <a:p>
+            <a:pPr algn="ctr"/>
+            <a:r>
+              <a:rPr lang="en-US" sz="1400" dirty="0" smtClean="0"/>
+              <a:t>10’s PB    100 GB/sec</a:t>
+            </a:r>
+          </a:p>
+          <a:p>
+            <a:pPr algn="ctr"/>
+            <a:r>
+              <a:rPr lang="en-US" sz="1400" dirty="0" smtClean="0"/>
+              <a:t>1-4 Weeks</a:t>
+            </a:r>
+            <a:endParaRPr lang="en-US" sz="1400" dirty="0"/>
+          </a:p>
+        </p:txBody>
+      </p:sp>
+      <p:sp>
+        <p:nvSpPr>
+          <p:cNvPr id="27" name="Cloud 26"/>
+          <p:cNvSpPr/>
+          <p:nvPr/>
+        </p:nvSpPr>
+        <p:spPr>
+          <a:xfrm>
+            <a:off x="473798" y="2670772"/>
+            <a:ext cx="633741" cy="208230"/>
+          </a:xfrm>
+          <a:prstGeom prst="cloud">
+            <a:avLst/>
+          </a:prstGeom>
+          <a:gradFill>
+            <a:gsLst>
+              <a:gs pos="0">
+                <a:srgbClr val="FFEFD1"/>
+              </a:gs>
+              <a:gs pos="64999">
+                <a:srgbClr val="F0EBD5"/>
+              </a:gs>
+              <a:gs pos="100000">
+                <a:srgbClr val="D1C39F"/>
+              </a:gs>
+            </a:gsLst>
+            <a:lin ang="16200000" scaled="0"/>
+          </a:gradFill>
+        </p:spPr>
+        <p:style>
+          <a:lnRef idx="1">
+            <a:schemeClr val="accent1"/>
+          </a:lnRef>
+          <a:fillRef idx="3">
+            <a:schemeClr val="accent1"/>
+          </a:fillRef>
+          <a:effectRef idx="2">
+            <a:schemeClr val="accent1"/>
+          </a:effectRef>
+          <a:fontRef idx="minor">
+            <a:schemeClr val="lt1"/>
+          </a:fontRef>
+        </p:style>
+        <p:txBody>
+          <a:bodyPr rtlCol="0" anchor="ctr"/>
+          <a:lstStyle/>
+          <a:p>
+            <a:pPr algn="ctr"/>
+            <a:endParaRPr lang="en-US"/>
+          </a:p>
+        </p:txBody>
+      </p:sp>
+      <p:sp>
+        <p:nvSpPr>
+          <p:cNvPr id="28" name="TextBox 27"/>
+          <p:cNvSpPr txBox="1"/>
+          <p:nvPr/>
+        </p:nvSpPr>
+        <p:spPr>
+          <a:xfrm>
+            <a:off x="-45269" y="2569447"/>
+            <a:ext cx="615636" cy="400110"/>
+          </a:xfrm>
+          <a:prstGeom prst="rect">
+            <a:avLst/>
+          </a:prstGeom>
+          <a:noFill/>
+        </p:spPr>
+        <p:txBody>
+          <a:bodyPr wrap="square" rtlCol="0">
+            <a:spAutoFit/>
+          </a:bodyPr>
+          <a:lstStyle/>
+          <a:p>
+            <a:pPr algn="ctr"/>
+            <a:r>
+              <a:rPr lang="en-US" sz="1000" dirty="0" smtClean="0"/>
+              <a:t>Private IB</a:t>
+            </a:r>
+            <a:endParaRPr lang="en-US" sz="1000" dirty="0"/>
+          </a:p>
+        </p:txBody>
+      </p:sp>
+      <p:cxnSp>
+        <p:nvCxnSpPr>
+          <p:cNvPr id="30" name="Straight Connector 29"/>
+          <p:cNvCxnSpPr>
+            <a:stCxn id="27" idx="3"/>
+          </p:cNvCxnSpPr>
+          <p:nvPr/>
+        </p:nvCxnSpPr>
+        <p:spPr>
+          <a:xfrm flipH="1" flipV="1">
+            <a:off x="790668" y="2548328"/>
+            <a:ext cx="1" cy="134350"/>
+          </a:xfrm>
+          <a:prstGeom prst="line">
+            <a:avLst/>
+          </a:prstGeom>
+        </p:spPr>
+        <p:style>
+          <a:lnRef idx="2">
+            <a:schemeClr val="accent1"/>
+          </a:lnRef>
+          <a:fillRef idx="0">
+            <a:schemeClr val="accent1"/>
+          </a:fillRef>
+          <a:effectRef idx="1">
+            <a:schemeClr val="accent1"/>
+          </a:effectRef>
+          <a:fontRef idx="minor">
+            <a:schemeClr val="tx1"/>
+          </a:fontRef>
+        </p:style>
+      </p:cxnSp>
+      <p:cxnSp>
+        <p:nvCxnSpPr>
+          <p:cNvPr id="31" name="Straight Connector 30"/>
+          <p:cNvCxnSpPr>
+            <a:endCxn id="27" idx="1"/>
+          </p:cNvCxnSpPr>
+          <p:nvPr/>
+        </p:nvCxnSpPr>
+        <p:spPr>
+          <a:xfrm flipH="1" flipV="1">
+            <a:off x="790669" y="2878780"/>
+            <a:ext cx="7553" cy="73987"/>
+          </a:xfrm>
+          <a:prstGeom prst="line">
+            <a:avLst/>
+          </a:prstGeom>
+        </p:spPr>
+        <p:style>
+          <a:lnRef idx="2">
+            <a:schemeClr val="accent1"/>
+          </a:lnRef>
+          <a:fillRef idx="0">
+            <a:schemeClr val="accent1"/>
+          </a:fillRef>
+          <a:effectRef idx="1">
+            <a:schemeClr val="accent1"/>
+          </a:effectRef>
+          <a:fontRef idx="minor">
+            <a:schemeClr val="tx1"/>
+          </a:fontRef>
+        </p:style>
+      </p:cxnSp>
+      <p:sp>
+        <p:nvSpPr>
+          <p:cNvPr id="33" name="Cloud 32"/>
+          <p:cNvSpPr/>
+          <p:nvPr/>
+        </p:nvSpPr>
+        <p:spPr>
+          <a:xfrm>
+            <a:off x="2685863" y="2769502"/>
+            <a:ext cx="2468576" cy="950614"/>
+          </a:xfrm>
+          <a:prstGeom prst="cloud">
+            <a:avLst/>
+          </a:prstGeom>
+          <a:gradFill>
+            <a:gsLst>
+              <a:gs pos="0">
+                <a:srgbClr val="FFEFD1"/>
+              </a:gs>
+              <a:gs pos="64999">
+                <a:srgbClr val="F0EBD5"/>
+              </a:gs>
+              <a:gs pos="100000">
+                <a:srgbClr val="D1C39F"/>
+              </a:gs>
+            </a:gsLst>
+            <a:lin ang="16200000" scaled="0"/>
+          </a:gradFill>
+        </p:spPr>
+        <p:style>
+          <a:lnRef idx="1">
+            <a:schemeClr val="accent1"/>
+          </a:lnRef>
+          <a:fillRef idx="3">
+            <a:schemeClr val="accent1"/>
+          </a:fillRef>
+          <a:effectRef idx="2">
+            <a:schemeClr val="accent1"/>
+          </a:effectRef>
+          <a:fontRef idx="minor">
+            <a:schemeClr val="lt1"/>
+          </a:fontRef>
+        </p:style>
+        <p:txBody>
+          <a:bodyPr rtlCol="0" anchor="ctr"/>
+          <a:lstStyle/>
+          <a:p>
+            <a:pPr algn="ctr"/>
+            <a:endParaRPr lang="en-US"/>
+          </a:p>
+        </p:txBody>
+      </p:sp>
+      <p:sp>
+        <p:nvSpPr>
+          <p:cNvPr id="34" name="TextBox 33"/>
+          <p:cNvSpPr txBox="1"/>
+          <p:nvPr/>
+        </p:nvSpPr>
+        <p:spPr>
+          <a:xfrm>
+            <a:off x="3375434" y="2897133"/>
+            <a:ext cx="1078870" cy="707886"/>
+          </a:xfrm>
+          <a:prstGeom prst="rect">
+            <a:avLst/>
+          </a:prstGeom>
+          <a:noFill/>
+        </p:spPr>
+        <p:txBody>
+          <a:bodyPr wrap="square" rtlCol="0">
+            <a:spAutoFit/>
+          </a:bodyPr>
+          <a:lstStyle/>
+          <a:p>
+            <a:pPr algn="ctr"/>
+            <a:r>
+              <a:rPr lang="en-US" sz="1000" dirty="0" smtClean="0"/>
+              <a:t>Site IB/Ether/</a:t>
+            </a:r>
+            <a:r>
+              <a:rPr lang="en-US" sz="1000" dirty="0" err="1" smtClean="0"/>
+              <a:t>Lnet</a:t>
+            </a:r>
+            <a:r>
+              <a:rPr lang="en-US" sz="1000" dirty="0" smtClean="0"/>
+              <a:t> Routers/switches (damselfly)</a:t>
+            </a:r>
+            <a:endParaRPr lang="en-US" sz="1000" dirty="0"/>
+          </a:p>
+        </p:txBody>
+      </p:sp>
+      <p:sp>
+        <p:nvSpPr>
+          <p:cNvPr id="35" name="TextBox 34"/>
+          <p:cNvSpPr txBox="1"/>
+          <p:nvPr/>
+        </p:nvSpPr>
+        <p:spPr>
+          <a:xfrm>
+            <a:off x="1828801" y="5344327"/>
+            <a:ext cx="1059255" cy="954107"/>
+          </a:xfrm>
+          <a:prstGeom prst="rect">
+            <a:avLst/>
+          </a:prstGeom>
+          <a:noFill/>
+          <a:ln>
+            <a:solidFill>
+              <a:schemeClr val="accent1"/>
+            </a:solidFill>
+          </a:ln>
+        </p:spPr>
+        <p:txBody>
+          <a:bodyPr wrap="square" rtlCol="0">
+            <a:spAutoFit/>
+          </a:bodyPr>
+          <a:lstStyle/>
+          <a:p>
+            <a:pPr algn="ctr"/>
+            <a:r>
+              <a:rPr lang="en-US" sz="1400" dirty="0" smtClean="0"/>
+              <a:t>HPSS 100 PB             10 GB/sec</a:t>
+            </a:r>
+          </a:p>
+          <a:p>
+            <a:pPr algn="ctr"/>
+            <a:r>
+              <a:rPr lang="en-US" sz="1400" dirty="0" smtClean="0"/>
+              <a:t>Forever</a:t>
+            </a:r>
+            <a:endParaRPr lang="en-US" sz="1400" dirty="0"/>
+          </a:p>
+        </p:txBody>
+      </p:sp>
+      <p:sp>
+        <p:nvSpPr>
+          <p:cNvPr id="36" name="TextBox 35"/>
+          <p:cNvSpPr txBox="1"/>
+          <p:nvPr/>
+        </p:nvSpPr>
+        <p:spPr>
+          <a:xfrm>
+            <a:off x="156924" y="5617842"/>
+            <a:ext cx="1059255" cy="954107"/>
+          </a:xfrm>
+          <a:prstGeom prst="rect">
+            <a:avLst/>
+          </a:prstGeom>
+          <a:noFill/>
+          <a:ln>
+            <a:solidFill>
+              <a:schemeClr val="accent1"/>
+            </a:solidFill>
+          </a:ln>
+        </p:spPr>
+        <p:txBody>
+          <a:bodyPr wrap="square" rtlCol="0">
+            <a:spAutoFit/>
+          </a:bodyPr>
+          <a:lstStyle/>
+          <a:p>
+            <a:pPr algn="ctr"/>
+            <a:r>
+              <a:rPr lang="en-US" sz="1400" dirty="0" smtClean="0"/>
+              <a:t>Site  Scratch</a:t>
+            </a:r>
+          </a:p>
+          <a:p>
+            <a:pPr algn="ctr"/>
+            <a:r>
+              <a:rPr lang="en-US" sz="1400" dirty="0" smtClean="0"/>
+              <a:t>10’s PB    100 GB/sec</a:t>
+            </a:r>
+          </a:p>
+          <a:p>
+            <a:pPr algn="ctr"/>
+            <a:r>
+              <a:rPr lang="en-US" sz="1400" dirty="0" smtClean="0"/>
+              <a:t>1-4 Weeks</a:t>
+            </a:r>
+            <a:endParaRPr lang="en-US" sz="1400" dirty="0"/>
+          </a:p>
+        </p:txBody>
+      </p:sp>
+      <p:sp>
+        <p:nvSpPr>
+          <p:cNvPr id="37" name="TextBox 36"/>
+          <p:cNvSpPr txBox="1"/>
+          <p:nvPr/>
+        </p:nvSpPr>
+        <p:spPr>
+          <a:xfrm>
+            <a:off x="3938258" y="5178275"/>
+            <a:ext cx="1059255" cy="1600438"/>
+          </a:xfrm>
+          <a:prstGeom prst="rect">
+            <a:avLst/>
+          </a:prstGeom>
+          <a:noFill/>
+          <a:ln>
+            <a:solidFill>
+              <a:schemeClr val="accent1"/>
+            </a:solidFill>
+          </a:ln>
+        </p:spPr>
+        <p:txBody>
+          <a:bodyPr wrap="square" rtlCol="0">
+            <a:spAutoFit/>
+          </a:bodyPr>
+          <a:lstStyle/>
+          <a:p>
+            <a:pPr algn="ctr"/>
+            <a:r>
+              <a:rPr lang="en-US" sz="1400" dirty="0" smtClean="0"/>
+              <a:t>Campaign MarFS 100’s PB           100’s GB/sec</a:t>
+            </a:r>
+          </a:p>
+          <a:p>
+            <a:pPr algn="ctr"/>
+            <a:r>
+              <a:rPr lang="en-US" sz="1400" dirty="0" smtClean="0"/>
+              <a:t>Few Years (erasure)</a:t>
+            </a:r>
+            <a:endParaRPr lang="en-US" sz="1400" dirty="0"/>
+          </a:p>
+        </p:txBody>
+      </p:sp>
+      <p:cxnSp>
+        <p:nvCxnSpPr>
+          <p:cNvPr id="38" name="Straight Connector 37"/>
+          <p:cNvCxnSpPr>
+            <a:endCxn id="5" idx="2"/>
+          </p:cNvCxnSpPr>
+          <p:nvPr/>
+        </p:nvCxnSpPr>
+        <p:spPr>
+          <a:xfrm flipH="1" flipV="1">
+            <a:off x="1810694" y="2531963"/>
+            <a:ext cx="1050202" cy="528108"/>
+          </a:xfrm>
+          <a:prstGeom prst="line">
+            <a:avLst/>
+          </a:prstGeom>
+        </p:spPr>
+        <p:style>
+          <a:lnRef idx="2">
+            <a:schemeClr val="accent1"/>
+          </a:lnRef>
+          <a:fillRef idx="0">
+            <a:schemeClr val="accent1"/>
+          </a:fillRef>
+          <a:effectRef idx="1">
+            <a:schemeClr val="accent1"/>
+          </a:effectRef>
+          <a:fontRef idx="minor">
+            <a:schemeClr val="tx1"/>
+          </a:fontRef>
+        </p:style>
+      </p:cxnSp>
+      <p:cxnSp>
+        <p:nvCxnSpPr>
+          <p:cNvPr id="41" name="Straight Connector 40"/>
+          <p:cNvCxnSpPr>
+            <a:stCxn id="33" idx="2"/>
+            <a:endCxn id="27" idx="0"/>
+          </p:cNvCxnSpPr>
+          <p:nvPr/>
+        </p:nvCxnSpPr>
+        <p:spPr>
+          <a:xfrm flipH="1" flipV="1">
+            <a:off x="1107011" y="2774887"/>
+            <a:ext cx="1586509" cy="469922"/>
+          </a:xfrm>
+          <a:prstGeom prst="line">
+            <a:avLst/>
+          </a:prstGeom>
+        </p:spPr>
+        <p:style>
+          <a:lnRef idx="2">
+            <a:schemeClr val="accent1"/>
+          </a:lnRef>
+          <a:fillRef idx="0">
+            <a:schemeClr val="accent1"/>
+          </a:fillRef>
+          <a:effectRef idx="1">
+            <a:schemeClr val="accent1"/>
+          </a:effectRef>
+          <a:fontRef idx="minor">
+            <a:schemeClr val="tx1"/>
+          </a:fontRef>
+        </p:style>
+      </p:cxnSp>
+      <p:cxnSp>
+        <p:nvCxnSpPr>
+          <p:cNvPr id="44" name="Straight Connector 43"/>
+          <p:cNvCxnSpPr>
+            <a:endCxn id="8" idx="2"/>
+          </p:cNvCxnSpPr>
+          <p:nvPr/>
+        </p:nvCxnSpPr>
+        <p:spPr>
+          <a:xfrm flipV="1">
+            <a:off x="4472412" y="2548328"/>
+            <a:ext cx="241425" cy="247689"/>
+          </a:xfrm>
+          <a:prstGeom prst="line">
+            <a:avLst/>
+          </a:prstGeom>
+        </p:spPr>
+        <p:style>
+          <a:lnRef idx="2">
+            <a:schemeClr val="accent1"/>
+          </a:lnRef>
+          <a:fillRef idx="0">
+            <a:schemeClr val="accent1"/>
+          </a:fillRef>
+          <a:effectRef idx="1">
+            <a:schemeClr val="accent1"/>
+          </a:effectRef>
+          <a:fontRef idx="minor">
+            <a:schemeClr val="tx1"/>
+          </a:fontRef>
+        </p:style>
+      </p:cxnSp>
+      <p:cxnSp>
+        <p:nvCxnSpPr>
+          <p:cNvPr id="47" name="Straight Connector 46"/>
+          <p:cNvCxnSpPr>
+            <a:endCxn id="12" idx="2"/>
+          </p:cNvCxnSpPr>
+          <p:nvPr/>
+        </p:nvCxnSpPr>
+        <p:spPr>
+          <a:xfrm flipV="1">
+            <a:off x="4997513" y="2548328"/>
+            <a:ext cx="2023448" cy="367446"/>
+          </a:xfrm>
+          <a:prstGeom prst="line">
+            <a:avLst/>
+          </a:prstGeom>
+        </p:spPr>
+        <p:style>
+          <a:lnRef idx="2">
+            <a:schemeClr val="accent1"/>
+          </a:lnRef>
+          <a:fillRef idx="0">
+            <a:schemeClr val="accent1"/>
+          </a:fillRef>
+          <a:effectRef idx="1">
+            <a:schemeClr val="accent1"/>
+          </a:effectRef>
+          <a:fontRef idx="minor">
+            <a:schemeClr val="tx1"/>
+          </a:fontRef>
+        </p:style>
+      </p:cxnSp>
+      <p:sp>
+        <p:nvSpPr>
+          <p:cNvPr id="50" name="TextBox 49"/>
+          <p:cNvSpPr txBox="1"/>
+          <p:nvPr/>
+        </p:nvSpPr>
+        <p:spPr>
+          <a:xfrm>
+            <a:off x="6631659" y="2739239"/>
+            <a:ext cx="1059255" cy="1169551"/>
+          </a:xfrm>
+          <a:prstGeom prst="rect">
+            <a:avLst/>
+          </a:prstGeom>
+          <a:noFill/>
+          <a:ln>
+            <a:solidFill>
+              <a:schemeClr val="accent1"/>
+            </a:solidFill>
+          </a:ln>
+        </p:spPr>
+        <p:txBody>
+          <a:bodyPr wrap="square" rtlCol="0">
+            <a:spAutoFit/>
+          </a:bodyPr>
+          <a:lstStyle/>
+          <a:p>
+            <a:pPr algn="ctr"/>
+            <a:r>
+              <a:rPr lang="en-US" sz="1400" dirty="0" smtClean="0"/>
+              <a:t>Batch File Transfer Agents ~100 at 2-8 GB/sec per</a:t>
+            </a:r>
+            <a:endParaRPr lang="en-US" sz="1400" dirty="0"/>
+          </a:p>
+        </p:txBody>
+      </p:sp>
+      <p:sp>
+        <p:nvSpPr>
+          <p:cNvPr id="51" name="TextBox 50"/>
+          <p:cNvSpPr txBox="1"/>
+          <p:nvPr/>
+        </p:nvSpPr>
+        <p:spPr>
+          <a:xfrm>
+            <a:off x="6631659" y="3976154"/>
+            <a:ext cx="1059255" cy="523220"/>
+          </a:xfrm>
+          <a:prstGeom prst="rect">
+            <a:avLst/>
+          </a:prstGeom>
+          <a:noFill/>
+          <a:ln>
+            <a:solidFill>
+              <a:schemeClr val="accent1"/>
+            </a:solidFill>
+          </a:ln>
+        </p:spPr>
+        <p:txBody>
+          <a:bodyPr wrap="square" rtlCol="0">
+            <a:spAutoFit/>
+          </a:bodyPr>
+          <a:lstStyle/>
+          <a:p>
+            <a:pPr algn="ctr"/>
+            <a:r>
+              <a:rPr lang="en-US" sz="1400" dirty="0" smtClean="0"/>
+              <a:t>Interactive FTA(s)</a:t>
+            </a:r>
+            <a:endParaRPr lang="en-US" sz="1400" dirty="0"/>
+          </a:p>
+        </p:txBody>
+      </p:sp>
+      <p:sp>
+        <p:nvSpPr>
+          <p:cNvPr id="52" name="TextBox 51"/>
+          <p:cNvSpPr txBox="1"/>
+          <p:nvPr/>
+        </p:nvSpPr>
+        <p:spPr>
+          <a:xfrm>
+            <a:off x="6645233" y="4569701"/>
+            <a:ext cx="1059255" cy="954107"/>
+          </a:xfrm>
+          <a:prstGeom prst="rect">
+            <a:avLst/>
+          </a:prstGeom>
+          <a:noFill/>
+          <a:ln>
+            <a:solidFill>
+              <a:schemeClr val="accent1"/>
+            </a:solidFill>
+          </a:ln>
+        </p:spPr>
+        <p:txBody>
+          <a:bodyPr wrap="square" rtlCol="0">
+            <a:spAutoFit/>
+          </a:bodyPr>
+          <a:lstStyle/>
+          <a:p>
+            <a:pPr algn="ctr"/>
+            <a:r>
+              <a:rPr lang="en-US" sz="1400" dirty="0" smtClean="0"/>
+              <a:t>WAN FTA(s)  Special Security Rules</a:t>
+            </a:r>
+            <a:endParaRPr lang="en-US" sz="1400" dirty="0"/>
+          </a:p>
+        </p:txBody>
+      </p:sp>
+      <p:cxnSp>
+        <p:nvCxnSpPr>
+          <p:cNvPr id="53" name="Straight Connector 52"/>
+          <p:cNvCxnSpPr/>
+          <p:nvPr/>
+        </p:nvCxnSpPr>
+        <p:spPr>
+          <a:xfrm>
+            <a:off x="7704488" y="4976435"/>
+            <a:ext cx="552272" cy="0"/>
+          </a:xfrm>
+          <a:prstGeom prst="line">
+            <a:avLst/>
+          </a:prstGeom>
+        </p:spPr>
+        <p:style>
+          <a:lnRef idx="2">
+            <a:schemeClr val="accent1"/>
+          </a:lnRef>
+          <a:fillRef idx="0">
+            <a:schemeClr val="accent1"/>
+          </a:fillRef>
+          <a:effectRef idx="1">
+            <a:schemeClr val="accent1"/>
+          </a:effectRef>
+          <a:fontRef idx="minor">
+            <a:schemeClr val="tx1"/>
+          </a:fontRef>
+        </p:style>
+      </p:cxnSp>
+      <p:sp>
+        <p:nvSpPr>
+          <p:cNvPr id="55" name="TextBox 54"/>
+          <p:cNvSpPr txBox="1"/>
+          <p:nvPr/>
+        </p:nvSpPr>
+        <p:spPr>
+          <a:xfrm>
+            <a:off x="8256760" y="4776380"/>
+            <a:ext cx="715224" cy="400110"/>
+          </a:xfrm>
+          <a:prstGeom prst="rect">
+            <a:avLst/>
+          </a:prstGeom>
+          <a:noFill/>
+        </p:spPr>
+        <p:txBody>
+          <a:bodyPr wrap="square" rtlCol="0">
+            <a:spAutoFit/>
+          </a:bodyPr>
+          <a:lstStyle/>
+          <a:p>
+            <a:pPr algn="ctr"/>
+            <a:r>
+              <a:rPr lang="en-US" sz="1000" dirty="0" smtClean="0"/>
+              <a:t>100(s) </a:t>
+            </a:r>
+            <a:r>
+              <a:rPr lang="en-US" sz="1000" dirty="0" err="1" smtClean="0"/>
+              <a:t>Gbits</a:t>
+            </a:r>
+            <a:r>
+              <a:rPr lang="en-US" sz="1000" dirty="0" smtClean="0"/>
+              <a:t>/sec</a:t>
+            </a:r>
+            <a:endParaRPr lang="en-US" sz="1000" dirty="0"/>
+          </a:p>
+        </p:txBody>
+      </p:sp>
+      <p:cxnSp>
+        <p:nvCxnSpPr>
+          <p:cNvPr id="56" name="Straight Connector 55"/>
+          <p:cNvCxnSpPr/>
+          <p:nvPr/>
+        </p:nvCxnSpPr>
+        <p:spPr>
+          <a:xfrm>
+            <a:off x="5094081" y="3086858"/>
+            <a:ext cx="1481746" cy="200055"/>
+          </a:xfrm>
+          <a:prstGeom prst="line">
+            <a:avLst/>
+          </a:prstGeom>
+        </p:spPr>
+        <p:style>
+          <a:lnRef idx="2">
+            <a:schemeClr val="accent1"/>
+          </a:lnRef>
+          <a:fillRef idx="0">
+            <a:schemeClr val="accent1"/>
+          </a:fillRef>
+          <a:effectRef idx="1">
+            <a:schemeClr val="accent1"/>
+          </a:effectRef>
+          <a:fontRef idx="minor">
+            <a:schemeClr val="tx1"/>
+          </a:fontRef>
+        </p:style>
+      </p:cxnSp>
+      <p:cxnSp>
+        <p:nvCxnSpPr>
+          <p:cNvPr id="59" name="Straight Connector 58"/>
+          <p:cNvCxnSpPr>
+            <a:stCxn id="33" idx="0"/>
+          </p:cNvCxnSpPr>
+          <p:nvPr/>
+        </p:nvCxnSpPr>
+        <p:spPr>
+          <a:xfrm>
+            <a:off x="5152382" y="3244809"/>
+            <a:ext cx="1492851" cy="1028427"/>
+          </a:xfrm>
+          <a:prstGeom prst="line">
+            <a:avLst/>
+          </a:prstGeom>
+        </p:spPr>
+        <p:style>
+          <a:lnRef idx="2">
+            <a:schemeClr val="accent1"/>
+          </a:lnRef>
+          <a:fillRef idx="0">
+            <a:schemeClr val="accent1"/>
+          </a:fillRef>
+          <a:effectRef idx="1">
+            <a:schemeClr val="accent1"/>
+          </a:effectRef>
+          <a:fontRef idx="minor">
+            <a:schemeClr val="tx1"/>
+          </a:fontRef>
+        </p:style>
+      </p:cxnSp>
+      <p:cxnSp>
+        <p:nvCxnSpPr>
+          <p:cNvPr id="62" name="Straight Connector 61"/>
+          <p:cNvCxnSpPr>
+            <a:endCxn id="52" idx="1"/>
+          </p:cNvCxnSpPr>
+          <p:nvPr/>
+        </p:nvCxnSpPr>
+        <p:spPr>
+          <a:xfrm>
+            <a:off x="4799844" y="3554332"/>
+            <a:ext cx="1845389" cy="1492423"/>
+          </a:xfrm>
+          <a:prstGeom prst="line">
+            <a:avLst/>
+          </a:prstGeom>
+        </p:spPr>
+        <p:style>
+          <a:lnRef idx="2">
+            <a:schemeClr val="accent1"/>
+          </a:lnRef>
+          <a:fillRef idx="0">
+            <a:schemeClr val="accent1"/>
+          </a:fillRef>
+          <a:effectRef idx="1">
+            <a:schemeClr val="accent1"/>
+          </a:effectRef>
+          <a:fontRef idx="minor">
+            <a:schemeClr val="tx1"/>
+          </a:fontRef>
+        </p:style>
+      </p:cxnSp>
+      <p:sp>
+        <p:nvSpPr>
+          <p:cNvPr id="65" name="TextBox 64"/>
+          <p:cNvSpPr txBox="1"/>
+          <p:nvPr/>
+        </p:nvSpPr>
+        <p:spPr>
+          <a:xfrm>
+            <a:off x="7826721" y="2975879"/>
+            <a:ext cx="1317280" cy="1569660"/>
+          </a:xfrm>
+          <a:prstGeom prst="rect">
+            <a:avLst/>
+          </a:prstGeom>
+          <a:noFill/>
+        </p:spPr>
+        <p:txBody>
+          <a:bodyPr wrap="square" rtlCol="0">
+            <a:spAutoFit/>
+          </a:bodyPr>
+          <a:lstStyle/>
+          <a:p>
+            <a:r>
+              <a:rPr lang="en-US" sz="1200" dirty="0" smtClean="0"/>
+              <a:t>/</a:t>
+            </a:r>
+            <a:r>
+              <a:rPr lang="en-US" sz="1200" dirty="0" err="1" smtClean="0"/>
+              <a:t>localscratch</a:t>
+            </a:r>
+            <a:r>
+              <a:rPr lang="en-US" sz="1200" dirty="0" smtClean="0"/>
+              <a:t>(s)</a:t>
+            </a:r>
+          </a:p>
+          <a:p>
+            <a:r>
+              <a:rPr lang="en-US" sz="1200" dirty="0" smtClean="0"/>
+              <a:t>/</a:t>
+            </a:r>
+            <a:r>
+              <a:rPr lang="en-US" sz="1200" dirty="0" err="1" smtClean="0"/>
+              <a:t>sitescratch</a:t>
+            </a:r>
+            <a:r>
+              <a:rPr lang="en-US" sz="1200" dirty="0" smtClean="0"/>
+              <a:t>(s)</a:t>
+            </a:r>
+          </a:p>
+          <a:p>
+            <a:r>
+              <a:rPr lang="en-US" sz="1200" dirty="0" smtClean="0"/>
+              <a:t>/home</a:t>
+            </a:r>
+          </a:p>
+          <a:p>
+            <a:r>
+              <a:rPr lang="en-US" sz="1200" dirty="0" smtClean="0"/>
+              <a:t>/project</a:t>
+            </a:r>
+          </a:p>
+          <a:p>
+            <a:r>
+              <a:rPr lang="en-US" sz="1200" dirty="0" smtClean="0"/>
+              <a:t>/campaign</a:t>
+            </a:r>
+          </a:p>
+          <a:p>
+            <a:r>
+              <a:rPr lang="en-US" sz="1200" dirty="0" smtClean="0"/>
+              <a:t>HPSS</a:t>
+            </a:r>
+          </a:p>
+          <a:p>
+            <a:r>
+              <a:rPr lang="en-US" sz="1200" dirty="0" smtClean="0">
+                <a:solidFill>
+                  <a:srgbClr val="FF0000"/>
+                </a:solidFill>
+              </a:rPr>
+              <a:t>/analytics     (HDFS other)</a:t>
+            </a:r>
+          </a:p>
+        </p:txBody>
+      </p:sp>
+      <p:sp>
+        <p:nvSpPr>
+          <p:cNvPr id="66" name="TextBox 65"/>
+          <p:cNvSpPr txBox="1"/>
+          <p:nvPr/>
+        </p:nvSpPr>
+        <p:spPr>
+          <a:xfrm>
+            <a:off x="7953462" y="2105964"/>
+            <a:ext cx="914407" cy="954107"/>
+          </a:xfrm>
+          <a:prstGeom prst="rect">
+            <a:avLst/>
+          </a:prstGeom>
+          <a:noFill/>
+        </p:spPr>
+        <p:txBody>
+          <a:bodyPr wrap="square" rtlCol="0">
+            <a:spAutoFit/>
+          </a:bodyPr>
+          <a:lstStyle/>
+          <a:p>
+            <a:pPr algn="ctr"/>
+            <a:r>
+              <a:rPr lang="en-US" sz="1400" dirty="0" smtClean="0"/>
+              <a:t>Parallel load balanced movers</a:t>
+            </a:r>
+            <a:endParaRPr lang="en-US" sz="1400" dirty="0"/>
+          </a:p>
+        </p:txBody>
+      </p:sp>
+      <p:cxnSp>
+        <p:nvCxnSpPr>
+          <p:cNvPr id="67" name="Straight Connector 66"/>
+          <p:cNvCxnSpPr>
+            <a:endCxn id="26" idx="3"/>
+          </p:cNvCxnSpPr>
+          <p:nvPr/>
+        </p:nvCxnSpPr>
+        <p:spPr>
+          <a:xfrm flipH="1">
+            <a:off x="1216180" y="3486968"/>
+            <a:ext cx="1572287" cy="1326491"/>
+          </a:xfrm>
+          <a:prstGeom prst="line">
+            <a:avLst/>
+          </a:prstGeom>
+        </p:spPr>
+        <p:style>
+          <a:lnRef idx="2">
+            <a:schemeClr val="accent1"/>
+          </a:lnRef>
+          <a:fillRef idx="0">
+            <a:schemeClr val="accent1"/>
+          </a:fillRef>
+          <a:effectRef idx="1">
+            <a:schemeClr val="accent1"/>
+          </a:effectRef>
+          <a:fontRef idx="minor">
+            <a:schemeClr val="tx1"/>
+          </a:fontRef>
+        </p:style>
+      </p:cxnSp>
+      <p:cxnSp>
+        <p:nvCxnSpPr>
+          <p:cNvPr id="70" name="Straight Connector 69"/>
+          <p:cNvCxnSpPr/>
+          <p:nvPr/>
+        </p:nvCxnSpPr>
+        <p:spPr>
+          <a:xfrm flipH="1">
+            <a:off x="1216180" y="3554332"/>
+            <a:ext cx="1744303" cy="2321367"/>
+          </a:xfrm>
+          <a:prstGeom prst="line">
+            <a:avLst/>
+          </a:prstGeom>
+        </p:spPr>
+        <p:style>
+          <a:lnRef idx="2">
+            <a:schemeClr val="accent1"/>
+          </a:lnRef>
+          <a:fillRef idx="0">
+            <a:schemeClr val="accent1"/>
+          </a:fillRef>
+          <a:effectRef idx="1">
+            <a:schemeClr val="accent1"/>
+          </a:effectRef>
+          <a:fontRef idx="minor">
+            <a:schemeClr val="tx1"/>
+          </a:fontRef>
+        </p:style>
+      </p:cxnSp>
+      <p:cxnSp>
+        <p:nvCxnSpPr>
+          <p:cNvPr id="74" name="Straight Connector 73"/>
+          <p:cNvCxnSpPr/>
+          <p:nvPr/>
+        </p:nvCxnSpPr>
+        <p:spPr>
+          <a:xfrm flipH="1">
+            <a:off x="2453491" y="3720116"/>
+            <a:ext cx="869132" cy="1619328"/>
+          </a:xfrm>
+          <a:prstGeom prst="line">
+            <a:avLst/>
+          </a:prstGeom>
+        </p:spPr>
+        <p:style>
+          <a:lnRef idx="2">
+            <a:schemeClr val="accent1"/>
+          </a:lnRef>
+          <a:fillRef idx="0">
+            <a:schemeClr val="accent1"/>
+          </a:fillRef>
+          <a:effectRef idx="1">
+            <a:schemeClr val="accent1"/>
+          </a:effectRef>
+          <a:fontRef idx="minor">
+            <a:schemeClr val="tx1"/>
+          </a:fontRef>
+        </p:style>
+      </p:cxnSp>
+      <p:sp>
+        <p:nvSpPr>
+          <p:cNvPr id="77" name="TextBox 76"/>
+          <p:cNvSpPr txBox="1"/>
+          <p:nvPr/>
+        </p:nvSpPr>
+        <p:spPr>
+          <a:xfrm>
+            <a:off x="1900265" y="6304002"/>
+            <a:ext cx="832925" cy="553998"/>
+          </a:xfrm>
+          <a:prstGeom prst="rect">
+            <a:avLst/>
+          </a:prstGeom>
+          <a:noFill/>
+        </p:spPr>
+        <p:txBody>
+          <a:bodyPr wrap="square" rtlCol="0">
+            <a:spAutoFit/>
+          </a:bodyPr>
+          <a:lstStyle/>
+          <a:p>
+            <a:pPr algn="ctr"/>
+            <a:r>
+              <a:rPr lang="en-US" sz="1000" dirty="0" smtClean="0"/>
+              <a:t>Parallel Tape with Disk Cache</a:t>
+            </a:r>
+            <a:endParaRPr lang="en-US" sz="1000" dirty="0"/>
+          </a:p>
+        </p:txBody>
+      </p:sp>
+      <p:sp>
+        <p:nvSpPr>
+          <p:cNvPr id="79" name="TextBox 78"/>
+          <p:cNvSpPr txBox="1"/>
+          <p:nvPr/>
+        </p:nvSpPr>
+        <p:spPr>
+          <a:xfrm>
+            <a:off x="2960483" y="5410667"/>
+            <a:ext cx="817828" cy="738664"/>
+          </a:xfrm>
+          <a:prstGeom prst="rect">
+            <a:avLst/>
+          </a:prstGeom>
+          <a:noFill/>
+          <a:ln>
+            <a:solidFill>
+              <a:schemeClr val="accent1"/>
+            </a:solidFill>
+          </a:ln>
+        </p:spPr>
+        <p:txBody>
+          <a:bodyPr wrap="square" rtlCol="0">
+            <a:spAutoFit/>
+          </a:bodyPr>
+          <a:lstStyle/>
+          <a:p>
+            <a:pPr algn="ctr"/>
+            <a:r>
+              <a:rPr lang="en-US" sz="1400" dirty="0" smtClean="0"/>
+              <a:t>NFS /home /project</a:t>
+            </a:r>
+            <a:endParaRPr lang="en-US" sz="1400" dirty="0"/>
+          </a:p>
+        </p:txBody>
+      </p:sp>
+      <p:cxnSp>
+        <p:nvCxnSpPr>
+          <p:cNvPr id="81" name="Straight Connector 80"/>
+          <p:cNvCxnSpPr>
+            <a:endCxn id="79" idx="0"/>
+          </p:cNvCxnSpPr>
+          <p:nvPr/>
+        </p:nvCxnSpPr>
+        <p:spPr>
+          <a:xfrm flipH="1">
+            <a:off x="3369397" y="3720116"/>
+            <a:ext cx="270096" cy="1690551"/>
+          </a:xfrm>
+          <a:prstGeom prst="line">
+            <a:avLst/>
+          </a:prstGeom>
+        </p:spPr>
+        <p:style>
+          <a:lnRef idx="2">
+            <a:schemeClr val="accent1"/>
+          </a:lnRef>
+          <a:fillRef idx="0">
+            <a:schemeClr val="accent1"/>
+          </a:fillRef>
+          <a:effectRef idx="1">
+            <a:schemeClr val="accent1"/>
+          </a:effectRef>
+          <a:fontRef idx="minor">
+            <a:schemeClr val="tx1"/>
+          </a:fontRef>
+        </p:style>
+      </p:cxnSp>
+      <p:cxnSp>
+        <p:nvCxnSpPr>
+          <p:cNvPr id="84" name="Straight Connector 83"/>
+          <p:cNvCxnSpPr>
+            <a:stCxn id="33" idx="1"/>
+          </p:cNvCxnSpPr>
+          <p:nvPr/>
+        </p:nvCxnSpPr>
+        <p:spPr>
+          <a:xfrm>
+            <a:off x="3920151" y="3719104"/>
+            <a:ext cx="443619" cy="1457386"/>
+          </a:xfrm>
+          <a:prstGeom prst="line">
+            <a:avLst/>
+          </a:prstGeom>
+        </p:spPr>
+        <p:style>
+          <a:lnRef idx="2">
+            <a:schemeClr val="accent1"/>
+          </a:lnRef>
+          <a:fillRef idx="0">
+            <a:schemeClr val="accent1"/>
+          </a:fillRef>
+          <a:effectRef idx="1">
+            <a:schemeClr val="accent1"/>
+          </a:effectRef>
+          <a:fontRef idx="minor">
+            <a:schemeClr val="tx1"/>
+          </a:fontRef>
+        </p:style>
+      </p:cxnSp>
+      <p:sp>
+        <p:nvSpPr>
+          <p:cNvPr id="87" name="TextBox 86"/>
+          <p:cNvSpPr txBox="1"/>
+          <p:nvPr/>
+        </p:nvSpPr>
+        <p:spPr>
+          <a:xfrm>
+            <a:off x="5216302" y="5421775"/>
+            <a:ext cx="1059255" cy="1384995"/>
+          </a:xfrm>
+          <a:prstGeom prst="rect">
+            <a:avLst/>
+          </a:prstGeom>
+          <a:noFill/>
+          <a:ln>
+            <a:solidFill>
+              <a:schemeClr val="accent1"/>
+            </a:solidFill>
+          </a:ln>
+        </p:spPr>
+        <p:txBody>
+          <a:bodyPr wrap="square" rtlCol="0">
+            <a:spAutoFit/>
+          </a:bodyPr>
+          <a:lstStyle/>
+          <a:p>
+            <a:pPr algn="ctr"/>
+            <a:r>
+              <a:rPr lang="en-US" sz="1400" dirty="0" smtClean="0">
+                <a:solidFill>
+                  <a:srgbClr val="FF0000"/>
+                </a:solidFill>
+              </a:rPr>
+              <a:t>Analytics machine </a:t>
+            </a:r>
+            <a:r>
+              <a:rPr lang="en-US" sz="1400" dirty="0">
+                <a:solidFill>
+                  <a:srgbClr val="FF0000"/>
+                </a:solidFill>
+              </a:rPr>
+              <a:t>p</a:t>
+            </a:r>
+            <a:r>
+              <a:rPr lang="en-US" sz="1400" dirty="0" smtClean="0">
+                <a:solidFill>
+                  <a:srgbClr val="FF0000"/>
+                </a:solidFill>
+              </a:rPr>
+              <a:t>otentially  disk full/big memory HDFS?</a:t>
+            </a:r>
+            <a:endParaRPr lang="en-US" sz="1400" dirty="0">
+              <a:solidFill>
+                <a:srgbClr val="FF0000"/>
+              </a:solidFill>
+            </a:endParaRPr>
+          </a:p>
+        </p:txBody>
+      </p:sp>
+      <p:cxnSp>
+        <p:nvCxnSpPr>
+          <p:cNvPr id="88" name="Straight Connector 87"/>
+          <p:cNvCxnSpPr/>
+          <p:nvPr/>
+        </p:nvCxnSpPr>
+        <p:spPr>
+          <a:xfrm>
+            <a:off x="4454304" y="3605019"/>
+            <a:ext cx="1268234" cy="1805648"/>
+          </a:xfrm>
+          <a:prstGeom prst="line">
+            <a:avLst/>
+          </a:prstGeom>
+        </p:spPr>
+        <p:style>
+          <a:lnRef idx="2">
+            <a:schemeClr val="accent1"/>
+          </a:lnRef>
+          <a:fillRef idx="0">
+            <a:schemeClr val="accent1"/>
+          </a:fillRef>
+          <a:effectRef idx="1">
+            <a:schemeClr val="accent1"/>
+          </a:effectRef>
+          <a:fontRef idx="minor">
+            <a:schemeClr val="tx1"/>
+          </a:fontRef>
+        </p:style>
+      </p:cxnSp>
+      <p:sp>
+        <p:nvSpPr>
+          <p:cNvPr id="91" name="TextBox 90"/>
+          <p:cNvSpPr txBox="1"/>
+          <p:nvPr/>
+        </p:nvSpPr>
+        <p:spPr>
+          <a:xfrm>
+            <a:off x="6255942" y="5633208"/>
+            <a:ext cx="1910283" cy="1015663"/>
+          </a:xfrm>
+          <a:prstGeom prst="rect">
+            <a:avLst/>
+          </a:prstGeom>
+          <a:noFill/>
+        </p:spPr>
+        <p:txBody>
+          <a:bodyPr wrap="square" rtlCol="0">
+            <a:spAutoFit/>
+          </a:bodyPr>
+          <a:lstStyle/>
+          <a:p>
+            <a:r>
+              <a:rPr lang="en-US" sz="1200" dirty="0" smtClean="0"/>
+              <a:t>/</a:t>
+            </a:r>
+            <a:r>
+              <a:rPr lang="en-US" sz="1200" dirty="0" err="1" smtClean="0"/>
+              <a:t>sitescratch</a:t>
+            </a:r>
+            <a:r>
+              <a:rPr lang="en-US" sz="1200" dirty="0" smtClean="0"/>
+              <a:t>(s)</a:t>
+            </a:r>
+          </a:p>
+          <a:p>
+            <a:r>
+              <a:rPr lang="en-US" sz="1200" dirty="0" smtClean="0"/>
+              <a:t>/campaign</a:t>
+            </a:r>
+          </a:p>
+          <a:p>
+            <a:r>
+              <a:rPr lang="en-US" sz="1200" dirty="0" smtClean="0">
+                <a:solidFill>
+                  <a:srgbClr val="FF0000"/>
+                </a:solidFill>
+              </a:rPr>
+              <a:t>/analytics     (HDFS other)</a:t>
+            </a:r>
+          </a:p>
+          <a:p>
+            <a:r>
+              <a:rPr lang="en-US" sz="1200" dirty="0" smtClean="0">
+                <a:solidFill>
+                  <a:srgbClr val="FF0000"/>
+                </a:solidFill>
+              </a:rPr>
+              <a:t>Use HDFS – POSIX Shim for access to POSIX resources</a:t>
+            </a:r>
+          </a:p>
+        </p:txBody>
+      </p:sp>
+      <p:sp>
+        <p:nvSpPr>
+          <p:cNvPr id="97" name="TextBox 96"/>
+          <p:cNvSpPr txBox="1"/>
+          <p:nvPr/>
+        </p:nvSpPr>
+        <p:spPr>
+          <a:xfrm>
+            <a:off x="7595853" y="695657"/>
+            <a:ext cx="1575303" cy="646331"/>
+          </a:xfrm>
+          <a:prstGeom prst="rect">
+            <a:avLst/>
+          </a:prstGeom>
+          <a:noFill/>
+        </p:spPr>
+        <p:txBody>
+          <a:bodyPr wrap="square" rtlCol="0">
+            <a:spAutoFit/>
+          </a:bodyPr>
+          <a:lstStyle/>
+          <a:p>
+            <a:r>
+              <a:rPr lang="en-US" sz="1200" dirty="0" smtClean="0"/>
+              <a:t>/</a:t>
+            </a:r>
+            <a:r>
+              <a:rPr lang="en-US" sz="1200" dirty="0" err="1" smtClean="0"/>
+              <a:t>sitescratch</a:t>
+            </a:r>
+            <a:r>
+              <a:rPr lang="en-US" sz="1200" dirty="0" smtClean="0"/>
+              <a:t>(s)</a:t>
+            </a:r>
+          </a:p>
+          <a:p>
+            <a:r>
+              <a:rPr lang="en-US" sz="1200" dirty="0" smtClean="0"/>
+              <a:t>/home</a:t>
+            </a:r>
+          </a:p>
+          <a:p>
+            <a:r>
+              <a:rPr lang="en-US" sz="1200" dirty="0" smtClean="0"/>
+              <a:t>/project</a:t>
+            </a:r>
+            <a:endParaRPr lang="en-US" sz="1200" dirty="0"/>
           </a:p>
         </p:txBody>
       </p:sp>
     </p:spTree>
     <p:extLst>
       <p:ext uri="{BB962C8B-B14F-4D97-AF65-F5344CB8AC3E}">
-        <p14:creationId xmlns:p14="http://schemas.microsoft.com/office/powerpoint/2010/main" val="2401668838"/>
+        <p14:creationId xmlns:p14="http://schemas.microsoft.com/office/powerpoint/2010/main" val="1825430190"/>
       </p:ext>
     </p:extLst>
   </p:cSld>
@@ -17095,6 +18974,316 @@
         </p:nvSpPr>
         <p:spPr>
           <a:xfrm>
+            <a:off x="457200" y="7938"/>
+            <a:ext cx="8229600" cy="512762"/>
+          </a:xfrm>
+        </p:spPr>
+        <p:txBody>
+          <a:bodyPr>
+            <a:normAutofit fontScale="90000"/>
+          </a:bodyPr>
+          <a:lstStyle/>
+          <a:p>
+            <a:r>
+              <a:rPr lang="en-US" dirty="0" smtClean="0"/>
+              <a:t>Security Model</a:t>
+            </a:r>
+            <a:endParaRPr lang="en-US" dirty="0"/>
+          </a:p>
+        </p:txBody>
+      </p:sp>
+      <p:sp>
+        <p:nvSpPr>
+          <p:cNvPr id="3" name="Content Placeholder 2"/>
+          <p:cNvSpPr>
+            <a:spLocks noGrp="1"/>
+          </p:cNvSpPr>
+          <p:nvPr>
+            <p:ph idx="1"/>
+          </p:nvPr>
+        </p:nvSpPr>
+        <p:spPr>
+          <a:xfrm>
+            <a:off x="114300" y="723900"/>
+            <a:ext cx="8915400" cy="6159500"/>
+          </a:xfrm>
+        </p:spPr>
+        <p:txBody>
+          <a:bodyPr>
+            <a:noAutofit/>
+          </a:bodyPr>
+          <a:lstStyle/>
+          <a:p>
+            <a:r>
+              <a:rPr lang="en-US" sz="2000" dirty="0"/>
+              <a:t>All  POSIX security is obeyed by </a:t>
+            </a:r>
+            <a:r>
+              <a:rPr lang="en-US" sz="2000" dirty="0" err="1" smtClean="0"/>
+              <a:t>MarFS</a:t>
+            </a:r>
+            <a:endParaRPr lang="en-US" sz="2000" dirty="0" smtClean="0"/>
+          </a:p>
+          <a:p>
+            <a:r>
+              <a:rPr lang="en-US" sz="2000" dirty="0"/>
+              <a:t>A</a:t>
+            </a:r>
+            <a:r>
+              <a:rPr lang="en-US" sz="2000" dirty="0" smtClean="0"/>
+              <a:t>ddition </a:t>
+            </a:r>
+            <a:r>
+              <a:rPr lang="en-US" sz="2000" dirty="0"/>
+              <a:t>special security can be added by configuration to manage what parts of the name space allow metadata and data update/</a:t>
+            </a:r>
+            <a:r>
+              <a:rPr lang="en-US" sz="2000" dirty="0" smtClean="0"/>
+              <a:t>read </a:t>
+            </a:r>
+          </a:p>
+          <a:p>
+            <a:pPr lvl="1"/>
+            <a:r>
+              <a:rPr lang="en-US" sz="2000" dirty="0" smtClean="0"/>
+              <a:t>and </a:t>
+            </a:r>
+            <a:r>
+              <a:rPr lang="en-US" sz="2000" dirty="0"/>
+              <a:t>you can control those special permissions for interactive and batch </a:t>
+            </a:r>
+            <a:r>
+              <a:rPr lang="en-US" sz="2000" dirty="0" smtClean="0"/>
+              <a:t>separately per name space.</a:t>
+            </a:r>
+            <a:endParaRPr lang="en-US" sz="2000" dirty="0"/>
+          </a:p>
+          <a:p>
+            <a:pPr lvl="2"/>
+            <a:r>
+              <a:rPr lang="en-US" sz="2000" dirty="0" err="1"/>
+              <a:t>rm</a:t>
+            </a:r>
+            <a:r>
+              <a:rPr lang="en-US" sz="2000" dirty="0"/>
+              <a:t> – read </a:t>
+            </a:r>
+            <a:r>
+              <a:rPr lang="en-US" sz="2000" dirty="0" smtClean="0"/>
+              <a:t>metadata    </a:t>
+            </a:r>
+            <a:r>
+              <a:rPr lang="en-US" sz="2000" dirty="0" err="1" smtClean="0"/>
+              <a:t>wm</a:t>
+            </a:r>
+            <a:r>
+              <a:rPr lang="en-US" sz="2000" dirty="0" smtClean="0"/>
+              <a:t> </a:t>
+            </a:r>
+            <a:r>
+              <a:rPr lang="en-US" sz="2000" dirty="0"/>
+              <a:t>– write </a:t>
+            </a:r>
+            <a:r>
+              <a:rPr lang="en-US" sz="2000" dirty="0" smtClean="0"/>
+              <a:t>metadata    </a:t>
+            </a:r>
+            <a:r>
+              <a:rPr lang="en-US" sz="2000" dirty="0" err="1" smtClean="0"/>
+              <a:t>rd</a:t>
+            </a:r>
+            <a:r>
+              <a:rPr lang="en-US" sz="2000" dirty="0" smtClean="0"/>
+              <a:t> </a:t>
+            </a:r>
+            <a:r>
+              <a:rPr lang="en-US" sz="2000" dirty="0"/>
+              <a:t>– read </a:t>
+            </a:r>
+            <a:r>
+              <a:rPr lang="en-US" sz="2000" dirty="0" smtClean="0"/>
+              <a:t>data     </a:t>
+            </a:r>
+            <a:r>
+              <a:rPr lang="en-US" sz="2000" dirty="0" err="1" smtClean="0"/>
+              <a:t>wd</a:t>
+            </a:r>
+            <a:r>
+              <a:rPr lang="en-US" sz="2000" dirty="0" smtClean="0"/>
+              <a:t> </a:t>
+            </a:r>
+            <a:r>
+              <a:rPr lang="en-US" sz="2000" dirty="0"/>
+              <a:t>– write </a:t>
+            </a:r>
+            <a:r>
+              <a:rPr lang="en-US" sz="2000" dirty="0" smtClean="0"/>
+              <a:t>data    </a:t>
+            </a:r>
+            <a:r>
+              <a:rPr lang="en-US" sz="2000" dirty="0" err="1" smtClean="0"/>
+              <a:t>ud</a:t>
+            </a:r>
+            <a:r>
+              <a:rPr lang="en-US" sz="2000" dirty="0" smtClean="0"/>
+              <a:t> </a:t>
+            </a:r>
+            <a:r>
+              <a:rPr lang="en-US" sz="2000" dirty="0"/>
+              <a:t>– unlink data</a:t>
+            </a:r>
+          </a:p>
+          <a:p>
+            <a:pPr lvl="2"/>
+            <a:r>
+              <a:rPr lang="en-US" sz="2000" dirty="0" smtClean="0"/>
+              <a:t>Can lock down data read/write separately from metadata read/update</a:t>
+            </a:r>
+          </a:p>
+          <a:p>
+            <a:pPr lvl="2"/>
+            <a:r>
+              <a:rPr lang="en-US" sz="2000" dirty="0"/>
+              <a:t>V</a:t>
+            </a:r>
+            <a:r>
+              <a:rPr lang="en-US" sz="2000" dirty="0" smtClean="0"/>
+              <a:t>alue </a:t>
+            </a:r>
+            <a:r>
+              <a:rPr lang="en-US" sz="2000" dirty="0"/>
+              <a:t>is not stored with the file, </a:t>
+            </a:r>
+            <a:r>
+              <a:rPr lang="en-US" sz="2000" dirty="0" smtClean="0"/>
+              <a:t>real </a:t>
+            </a:r>
+            <a:r>
+              <a:rPr lang="en-US" sz="2000" dirty="0"/>
+              <a:t>time, </a:t>
+            </a:r>
+            <a:r>
+              <a:rPr lang="en-US" sz="2000" dirty="0" smtClean="0"/>
+              <a:t>fast </a:t>
+            </a:r>
+            <a:r>
+              <a:rPr lang="en-US" sz="2000" dirty="0"/>
+              <a:t>way to </a:t>
+            </a:r>
+            <a:r>
+              <a:rPr lang="en-US" sz="2000" dirty="0" smtClean="0"/>
+              <a:t>control access.</a:t>
+            </a:r>
+            <a:endParaRPr lang="en-US" sz="2000" dirty="0"/>
+          </a:p>
+          <a:p>
+            <a:r>
+              <a:rPr lang="en-US" sz="2000" dirty="0"/>
+              <a:t>Object Security is provided by the following methods</a:t>
+            </a:r>
+          </a:p>
+          <a:p>
+            <a:pPr lvl="1"/>
+            <a:r>
+              <a:rPr lang="en-US" sz="2000" dirty="0" smtClean="0"/>
+              <a:t>Password for Object Server access is stashed safely, can be time based, crypto securely sent to Object Server on every request.</a:t>
+            </a:r>
+          </a:p>
+          <a:p>
+            <a:pPr lvl="1"/>
+            <a:r>
+              <a:rPr lang="en-US" sz="2000" dirty="0" smtClean="0"/>
+              <a:t>Encryption in the </a:t>
+            </a:r>
+            <a:r>
+              <a:rPr lang="en-US" sz="2000" dirty="0"/>
+              <a:t>data path </a:t>
+            </a:r>
+            <a:r>
+              <a:rPr lang="en-US" sz="2000" dirty="0" smtClean="0"/>
+              <a:t>to objects can be turned on</a:t>
+            </a:r>
+          </a:p>
+          <a:p>
+            <a:pPr lvl="1"/>
+            <a:r>
+              <a:rPr lang="en-US" sz="2000" dirty="0" smtClean="0"/>
+              <a:t>Encryption </a:t>
+            </a:r>
+            <a:r>
+              <a:rPr lang="en-US" sz="2000" dirty="0"/>
+              <a:t>at rest </a:t>
+            </a:r>
+            <a:r>
+              <a:rPr lang="en-US" sz="2000" dirty="0" smtClean="0"/>
+              <a:t>could be implemented and is on the futures list. </a:t>
+            </a:r>
+            <a:r>
+              <a:rPr lang="en-US" sz="2000" dirty="0"/>
+              <a:t> </a:t>
+            </a:r>
+            <a:endParaRPr lang="en-US" sz="2000" dirty="0" smtClean="0"/>
+          </a:p>
+          <a:p>
+            <a:pPr lvl="1"/>
+            <a:r>
+              <a:rPr lang="en-US" sz="2000" dirty="0" smtClean="0"/>
+              <a:t>Protecting </a:t>
+            </a:r>
+            <a:r>
+              <a:rPr lang="en-US" sz="2000" dirty="0"/>
+              <a:t>the trash is essential </a:t>
+            </a:r>
+            <a:r>
+              <a:rPr lang="en-US" sz="2000" dirty="0" smtClean="0"/>
+              <a:t>as well</a:t>
+            </a:r>
+            <a:endParaRPr lang="en-US" sz="2000" dirty="0"/>
+          </a:p>
+        </p:txBody>
+      </p:sp>
+    </p:spTree>
+    <p:extLst>
+      <p:ext uri="{BB962C8B-B14F-4D97-AF65-F5344CB8AC3E}">
+        <p14:creationId xmlns:p14="http://schemas.microsoft.com/office/powerpoint/2010/main" val="2401668838"/>
+      </p:ext>
+    </p:extLst>
+  </p:cSld>
+  <p:clrMapOvr>
+    <a:masterClrMapping/>
+  </p:clrMapOvr>
+</p:sld>
+</file>
+
+<file path=ppt/slides/slide22.xml><?xml version="1.0" encoding="utf-8"?>
+<p:sld xmlns:a="http://schemas.openxmlformats.org/drawingml/2006/main" xmlns:r="http://schemas.openxmlformats.org/officeDocument/2006/relationships" xmlns:p="http://schemas.openxmlformats.org/presentationml/2006/main">
+  <p:cSld>
+    <p:spTree>
+      <p:nvGrpSpPr>
+        <p:cNvPr id="1" name=""/>
+        <p:cNvGrpSpPr/>
+        <p:nvPr/>
+      </p:nvGrpSpPr>
+      <p:grpSpPr>
+        <a:xfrm>
+          <a:off x="0" y="0"/>
+          <a:ext cx="0" cy="0"/>
+          <a:chOff x="0" y="0"/>
+          <a:chExt cx="0" cy="0"/>
+        </a:xfrm>
+      </p:grpSpPr>
+      <p:sp>
+        <p:nvSpPr>
+          <p:cNvPr id="2" name="Title 1"/>
+          <p:cNvSpPr>
+            <a:spLocks noGrp="1"/>
+          </p:cNvSpPr>
+          <p:nvPr>
+            <p:ph type="title"/>
+          </p:nvPr>
+        </p:nvSpPr>
+        <p:spPr>
+          <a:xfrm>
             <a:off x="457200" y="-1587"/>
             <a:ext cx="8229600" cy="487362"/>
           </a:xfrm>
@@ -17327,7 +19516,7 @@
 </p:sld>
 </file>
 
-<file path=ppt/slides/slide22.xml><?xml version="1.0" encoding="utf-8"?>
+<file path=ppt/slides/slide23.xml><?xml version="1.0" encoding="utf-8"?>
 <p:sld xmlns:a="http://schemas.openxmlformats.org/drawingml/2006/main" xmlns:r="http://schemas.openxmlformats.org/officeDocument/2006/relationships" xmlns:p="http://schemas.openxmlformats.org/presentationml/2006/main">
   <p:cSld>
     <p:spTree>

</xml_diff>